<commit_message>
completed most of the slides except evaluation and results;
</commit_message>
<xml_diff>
--- a/Tracking/17_5_22 Learning to Track Online Multi-object Tracking by Decision Making  iccv15/mdp_tracking.pptx
+++ b/Tracking/17_5_22 Learning to Track Online Multi-object Tracking by Decision Making  iccv15/mdp_tracking.pptx
@@ -5,7 +5,7 @@
     <p:sldMasterId id="2147483660" r:id="rId1"/>
   </p:sldMasterIdLst>
   <p:notesMasterIdLst>
-    <p:notesMasterId r:id="rId13"/>
+    <p:notesMasterId r:id="rId15"/>
   </p:notesMasterIdLst>
   <p:sldIdLst>
     <p:sldId id="256" r:id="rId2"/>
@@ -17,8 +17,10 @@
     <p:sldId id="263" r:id="rId8"/>
     <p:sldId id="262" r:id="rId9"/>
     <p:sldId id="265" r:id="rId10"/>
-    <p:sldId id="266" r:id="rId11"/>
-    <p:sldId id="267" r:id="rId12"/>
+    <p:sldId id="270" r:id="rId11"/>
+    <p:sldId id="266" r:id="rId12"/>
+    <p:sldId id="267" r:id="rId13"/>
+    <p:sldId id="268" r:id="rId14"/>
   </p:sldIdLst>
   <p:sldSz cx="9144000" cy="6858000" type="screen4x3"/>
   <p:notesSz cx="6858000" cy="9144000"/>
@@ -117,6 +119,11 @@
       </a:defRPr>
     </a:lvl9pPr>
   </p:defaultTextStyle>
+  <p:extLst>
+    <p:ext uri="{EFAFB233-063F-42B5-8137-9DF3F51BA10A}">
+      <p15:sldGuideLst xmlns:p15="http://schemas.microsoft.com/office/powerpoint/2012/main"/>
+    </p:ext>
+  </p:extLst>
 </p:presentation>
 </file>
 
@@ -628,7 +635,175 @@
     </p:spTree>
     <p:extLst>
       <p:ext uri="{BB962C8B-B14F-4D97-AF65-F5344CB8AC3E}">
+        <p14:creationId xmlns:p14="http://schemas.microsoft.com/office/powerpoint/2010/main" val="2677467665"/>
+      </p:ext>
+    </p:extLst>
+  </p:cSld>
+  <p:clrMapOvr>
+    <a:masterClrMapping/>
+  </p:clrMapOvr>
+</p:notes>
+</file>
+
+<file path=ppt/notesSlides/notesSlide11.xml><?xml version="1.0" encoding="utf-8"?>
+<p:notes xmlns:a="http://schemas.openxmlformats.org/drawingml/2006/main" xmlns:r="http://schemas.openxmlformats.org/officeDocument/2006/relationships" xmlns:p="http://schemas.openxmlformats.org/presentationml/2006/main">
+  <p:cSld>
+    <p:spTree>
+      <p:nvGrpSpPr>
+        <p:cNvPr id="1" name=""/>
+        <p:cNvGrpSpPr/>
+        <p:nvPr/>
+      </p:nvGrpSpPr>
+      <p:grpSpPr>
+        <a:xfrm>
+          <a:off x="0" y="0"/>
+          <a:ext cx="0" cy="0"/>
+          <a:chOff x="0" y="0"/>
+          <a:chExt cx="0" cy="0"/>
+        </a:xfrm>
+      </p:grpSpPr>
+      <p:sp>
+        <p:nvSpPr>
+          <p:cNvPr id="2" name="Slide Image Placeholder 1"/>
+          <p:cNvSpPr>
+            <a:spLocks noGrp="1" noRot="1" noChangeAspect="1"/>
+          </p:cNvSpPr>
+          <p:nvPr>
+            <p:ph type="sldImg"/>
+          </p:nvPr>
+        </p:nvSpPr>
+        <p:spPr/>
+      </p:sp>
+      <p:sp>
+        <p:nvSpPr>
+          <p:cNvPr id="3" name="Notes Placeholder 2"/>
+          <p:cNvSpPr>
+            <a:spLocks noGrp="1"/>
+          </p:cNvSpPr>
+          <p:nvPr>
+            <p:ph type="body" idx="1"/>
+          </p:nvPr>
+        </p:nvSpPr>
+        <p:spPr/>
+        <p:txBody>
+          <a:bodyPr/>
+          <a:lstStyle/>
+          <a:p>
+            <a:endParaRPr lang="en-US" dirty="0"/>
+          </a:p>
+        </p:txBody>
+      </p:sp>
+      <p:sp>
+        <p:nvSpPr>
+          <p:cNvPr id="4" name="Slide Number Placeholder 3"/>
+          <p:cNvSpPr>
+            <a:spLocks noGrp="1"/>
+          </p:cNvSpPr>
+          <p:nvPr>
+            <p:ph type="sldNum" sz="quarter" idx="10"/>
+          </p:nvPr>
+        </p:nvSpPr>
+        <p:spPr/>
+        <p:txBody>
+          <a:bodyPr/>
+          <a:lstStyle/>
+          <a:p>
+            <a:fld id="{6D44A11D-680A-4E92-AD72-187D8DFAA3A6}" type="slidenum">
+              <a:rPr lang="en-US" smtClean="0"/>
+              <a:t>12</a:t>
+            </a:fld>
+            <a:endParaRPr lang="en-US"/>
+          </a:p>
+        </p:txBody>
+      </p:sp>
+    </p:spTree>
+    <p:extLst>
+      <p:ext uri="{BB962C8B-B14F-4D97-AF65-F5344CB8AC3E}">
         <p14:creationId xmlns:p14="http://schemas.microsoft.com/office/powerpoint/2010/main" val="2838220071"/>
+      </p:ext>
+    </p:extLst>
+  </p:cSld>
+  <p:clrMapOvr>
+    <a:masterClrMapping/>
+  </p:clrMapOvr>
+</p:notes>
+</file>
+
+<file path=ppt/notesSlides/notesSlide12.xml><?xml version="1.0" encoding="utf-8"?>
+<p:notes xmlns:a="http://schemas.openxmlformats.org/drawingml/2006/main" xmlns:r="http://schemas.openxmlformats.org/officeDocument/2006/relationships" xmlns:p="http://schemas.openxmlformats.org/presentationml/2006/main">
+  <p:cSld>
+    <p:spTree>
+      <p:nvGrpSpPr>
+        <p:cNvPr id="1" name=""/>
+        <p:cNvGrpSpPr/>
+        <p:nvPr/>
+      </p:nvGrpSpPr>
+      <p:grpSpPr>
+        <a:xfrm>
+          <a:off x="0" y="0"/>
+          <a:ext cx="0" cy="0"/>
+          <a:chOff x="0" y="0"/>
+          <a:chExt cx="0" cy="0"/>
+        </a:xfrm>
+      </p:grpSpPr>
+      <p:sp>
+        <p:nvSpPr>
+          <p:cNvPr id="2" name="Slide Image Placeholder 1"/>
+          <p:cNvSpPr>
+            <a:spLocks noGrp="1" noRot="1" noChangeAspect="1"/>
+          </p:cNvSpPr>
+          <p:nvPr>
+            <p:ph type="sldImg"/>
+          </p:nvPr>
+        </p:nvSpPr>
+        <p:spPr/>
+      </p:sp>
+      <p:sp>
+        <p:nvSpPr>
+          <p:cNvPr id="3" name="Notes Placeholder 2"/>
+          <p:cNvSpPr>
+            <a:spLocks noGrp="1"/>
+          </p:cNvSpPr>
+          <p:nvPr>
+            <p:ph type="body" idx="1"/>
+          </p:nvPr>
+        </p:nvSpPr>
+        <p:spPr/>
+        <p:txBody>
+          <a:bodyPr/>
+          <a:lstStyle/>
+          <a:p>
+            <a:endParaRPr lang="en-US" dirty="0"/>
+          </a:p>
+        </p:txBody>
+      </p:sp>
+      <p:sp>
+        <p:nvSpPr>
+          <p:cNvPr id="4" name="Slide Number Placeholder 3"/>
+          <p:cNvSpPr>
+            <a:spLocks noGrp="1"/>
+          </p:cNvSpPr>
+          <p:nvPr>
+            <p:ph type="sldNum" sz="quarter" idx="10"/>
+          </p:nvPr>
+        </p:nvSpPr>
+        <p:spPr/>
+        <p:txBody>
+          <a:bodyPr/>
+          <a:lstStyle/>
+          <a:p>
+            <a:fld id="{6D44A11D-680A-4E92-AD72-187D8DFAA3A6}" type="slidenum">
+              <a:rPr lang="en-US" smtClean="0"/>
+              <a:t>13</a:t>
+            </a:fld>
+            <a:endParaRPr lang="en-US"/>
+          </a:p>
+        </p:txBody>
+      </p:sp>
+    </p:spTree>
+    <p:extLst>
+      <p:ext uri="{BB962C8B-B14F-4D97-AF65-F5344CB8AC3E}">
+        <p14:creationId xmlns:p14="http://schemas.microsoft.com/office/powerpoint/2010/main" val="962311367"/>
       </p:ext>
     </p:extLst>
   </p:cSld>
@@ -1027,12 +1202,30 @@
           <a:p>
             <a:r>
               <a:rPr lang="en-US" dirty="0" smtClean="0"/>
-              <a:t>The framework is general so can employ any tracking method; the decision to classify an </a:t>
-            </a:r>
-            <a:r>
-              <a:rPr lang="en-US" smtClean="0"/>
-              <a:t>existing object</a:t>
-            </a:r>
+              <a:t>The framework is general so can employ any tracking method; the decision to classify an existing object;</a:t>
+            </a:r>
+          </a:p>
+          <a:p>
+            <a:r>
+              <a:rPr lang="en-US" dirty="0" smtClean="0"/>
+              <a:t>A set of patches/templates are stored – one from each tracked frame – though the latest one may not be the one being used as the template for optical flow;</a:t>
+            </a:r>
+          </a:p>
+          <a:p>
+            <a:r>
+              <a:rPr lang="en-US" dirty="0" smtClean="0"/>
+              <a:t>This delayed update is done to reduce tracker drift that inevitably follows when updating</a:t>
+            </a:r>
+            <a:r>
+              <a:rPr lang="en-US" baseline="0" dirty="0" smtClean="0"/>
+              <a:t> the template </a:t>
+            </a:r>
+            <a:r>
+              <a:rPr lang="en-US" baseline="0" smtClean="0"/>
+              <a:t>too frequently;</a:t>
+            </a:r>
+          </a:p>
+          <a:p>
             <a:endParaRPr lang="en-US" dirty="0"/>
           </a:p>
         </p:txBody>
@@ -1407,7 +1600,7 @@
     </p:spTree>
     <p:extLst>
       <p:ext uri="{BB962C8B-B14F-4D97-AF65-F5344CB8AC3E}">
-        <p14:creationId xmlns:p14="http://schemas.microsoft.com/office/powerpoint/2010/main" val="2677467665"/>
+        <p14:creationId xmlns:p14="http://schemas.microsoft.com/office/powerpoint/2010/main" val="78310080"/>
       </p:ext>
     </p:extLst>
   </p:cSld>
@@ -4486,7 +4679,7 @@
             <a:pPr algn="ctr"/>
             <a:r>
               <a:rPr lang="en-US" dirty="0" smtClean="0"/>
-              <a:t>Lost State Policy – RL Algorithm</a:t>
+              <a:t>Lost State Policy – Features</a:t>
             </a:r>
             <a:endParaRPr lang="en-US" dirty="0"/>
           </a:p>
@@ -4494,7 +4687,7 @@
       </p:sp>
       <p:pic>
         <p:nvPicPr>
-          <p:cNvPr id="2" name="Picture 1"/>
+          <p:cNvPr id="4" name="Picture 3"/>
           <p:cNvPicPr>
             <a:picLocks noChangeAspect="1"/>
           </p:cNvPicPr>
@@ -4514,18 +4707,23 @@
         </p:blipFill>
         <p:spPr>
           <a:xfrm>
-            <a:off x="2182091" y="726842"/>
-            <a:ext cx="5299363" cy="5991743"/>
+            <a:off x="869885" y="811529"/>
+            <a:ext cx="7404230" cy="5599836"/>
           </a:xfrm>
           <a:prstGeom prst="rect">
             <a:avLst/>
           </a:prstGeom>
+          <a:ln>
+            <a:solidFill>
+              <a:schemeClr val="tx1"/>
+            </a:solidFill>
+          </a:ln>
         </p:spPr>
       </p:pic>
     </p:spTree>
     <p:extLst>
       <p:ext uri="{BB962C8B-B14F-4D97-AF65-F5344CB8AC3E}">
-        <p14:creationId xmlns:p14="http://schemas.microsoft.com/office/powerpoint/2010/main" val="367886384"/>
+        <p14:creationId xmlns:p14="http://schemas.microsoft.com/office/powerpoint/2010/main" val="2670463052"/>
       </p:ext>
     </p:extLst>
   </p:cSld>
@@ -4599,7 +4797,12 @@
             <p:ph type="sldNum" sz="quarter" idx="12"/>
           </p:nvPr>
         </p:nvSpPr>
-        <p:spPr/>
+        <p:spPr>
+          <a:xfrm>
+            <a:off x="1" y="7453"/>
+            <a:ext cx="470188" cy="365125"/>
+          </a:xfrm>
+        </p:spPr>
         <p:txBody>
           <a:bodyPr/>
           <a:lstStyle/>
@@ -4608,7 +4811,7 @@
               <a:rPr lang="en-US" smtClean="0"/>
               <a:t>11</a:t>
             </a:fld>
-            <a:endParaRPr lang="en-US"/>
+            <a:endParaRPr lang="en-US" dirty="0"/>
           </a:p>
         </p:txBody>
       </p:sp>
@@ -4637,7 +4840,266 @@
             <a:pPr algn="ctr"/>
             <a:r>
               <a:rPr lang="en-US" dirty="0" smtClean="0"/>
-              <a:t>Overall MDP Algorithm</a:t>
+              <a:t>Lost State Policy – RL Algorithm</a:t>
+            </a:r>
+            <a:endParaRPr lang="en-US" dirty="0"/>
+          </a:p>
+        </p:txBody>
+      </p:sp>
+      <p:pic>
+        <p:nvPicPr>
+          <p:cNvPr id="2" name="Picture 1"/>
+          <p:cNvPicPr>
+            <a:picLocks noChangeAspect="1"/>
+          </p:cNvPicPr>
+          <p:nvPr/>
+        </p:nvPicPr>
+        <p:blipFill>
+          <a:blip r:embed="rId3">
+            <a:extLst>
+              <a:ext uri="{28A0092B-C50C-407E-A947-70E740481C1C}">
+                <a14:useLocalDpi xmlns:a14="http://schemas.microsoft.com/office/drawing/2010/main" val="0"/>
+              </a:ext>
+            </a:extLst>
+          </a:blip>
+          <a:stretch>
+            <a:fillRect/>
+          </a:stretch>
+        </p:blipFill>
+        <p:spPr>
+          <a:xfrm>
+            <a:off x="72739" y="726842"/>
+            <a:ext cx="5299363" cy="5991743"/>
+          </a:xfrm>
+          <a:prstGeom prst="rect">
+            <a:avLst/>
+          </a:prstGeom>
+          <a:ln>
+            <a:solidFill>
+              <a:schemeClr val="tx1"/>
+            </a:solidFill>
+          </a:ln>
+        </p:spPr>
+      </p:pic>
+      <p:pic>
+        <p:nvPicPr>
+          <p:cNvPr id="4" name="Picture 3"/>
+          <p:cNvPicPr>
+            <a:picLocks noChangeAspect="1"/>
+          </p:cNvPicPr>
+          <p:nvPr/>
+        </p:nvPicPr>
+        <p:blipFill>
+          <a:blip r:embed="rId4">
+            <a:extLst>
+              <a:ext uri="{28A0092B-C50C-407E-A947-70E740481C1C}">
+                <a14:useLocalDpi xmlns:a14="http://schemas.microsoft.com/office/drawing/2010/main" val="0"/>
+              </a:ext>
+            </a:extLst>
+          </a:blip>
+          <a:stretch>
+            <a:fillRect/>
+          </a:stretch>
+        </p:blipFill>
+        <p:spPr>
+          <a:xfrm>
+            <a:off x="5392884" y="5816132"/>
+            <a:ext cx="3651466" cy="902453"/>
+          </a:xfrm>
+          <a:prstGeom prst="rect">
+            <a:avLst/>
+          </a:prstGeom>
+          <a:ln>
+            <a:solidFill>
+              <a:schemeClr val="tx1"/>
+            </a:solidFill>
+          </a:ln>
+        </p:spPr>
+      </p:pic>
+      <p:sp>
+        <p:nvSpPr>
+          <p:cNvPr id="5" name="TextBox 4"/>
+          <p:cNvSpPr txBox="1"/>
+          <p:nvPr/>
+        </p:nvSpPr>
+        <p:spPr>
+          <a:xfrm>
+            <a:off x="5476013" y="5138786"/>
+            <a:ext cx="3647212" cy="646331"/>
+          </a:xfrm>
+          <a:prstGeom prst="rect">
+            <a:avLst/>
+          </a:prstGeom>
+          <a:noFill/>
+        </p:spPr>
+        <p:txBody>
+          <a:bodyPr wrap="square" rtlCol="0">
+            <a:spAutoFit/>
+          </a:bodyPr>
+          <a:lstStyle/>
+          <a:p>
+            <a:r>
+              <a:rPr lang="en-US" dirty="0" smtClean="0"/>
+              <a:t>Update Classifier by solving soft margin optimization problem:</a:t>
+            </a:r>
+            <a:endParaRPr lang="en-US" dirty="0"/>
+          </a:p>
+        </p:txBody>
+      </p:sp>
+      <p:cxnSp>
+        <p:nvCxnSpPr>
+          <p:cNvPr id="9" name="Straight Arrow Connector 8"/>
+          <p:cNvCxnSpPr>
+            <a:endCxn id="5" idx="1"/>
+          </p:cNvCxnSpPr>
+          <p:nvPr/>
+        </p:nvCxnSpPr>
+        <p:spPr>
+          <a:xfrm>
+            <a:off x="4353790" y="4281055"/>
+            <a:ext cx="1122223" cy="1180897"/>
+          </a:xfrm>
+          <a:prstGeom prst="straightConnector1">
+            <a:avLst/>
+          </a:prstGeom>
+          <a:ln w="19050">
+            <a:solidFill>
+              <a:srgbClr val="FF0000"/>
+            </a:solidFill>
+            <a:tailEnd type="triangle"/>
+          </a:ln>
+        </p:spPr>
+        <p:style>
+          <a:lnRef idx="1">
+            <a:schemeClr val="accent1"/>
+          </a:lnRef>
+          <a:fillRef idx="0">
+            <a:schemeClr val="accent1"/>
+          </a:fillRef>
+          <a:effectRef idx="0">
+            <a:schemeClr val="accent1"/>
+          </a:effectRef>
+          <a:fontRef idx="minor">
+            <a:schemeClr val="tx1"/>
+          </a:fontRef>
+        </p:style>
+      </p:cxnSp>
+    </p:spTree>
+    <p:extLst>
+      <p:ext uri="{BB962C8B-B14F-4D97-AF65-F5344CB8AC3E}">
+        <p14:creationId xmlns:p14="http://schemas.microsoft.com/office/powerpoint/2010/main" val="367886384"/>
+      </p:ext>
+    </p:extLst>
+  </p:cSld>
+  <p:clrMapOvr>
+    <a:masterClrMapping/>
+  </p:clrMapOvr>
+  <p:timing>
+    <p:tnLst>
+      <p:par>
+        <p:cTn id="1" dur="indefinite" restart="never" nodeType="tmRoot"/>
+      </p:par>
+    </p:tnLst>
+  </p:timing>
+</p:sld>
+</file>
+
+<file path=ppt/slides/slide12.xml><?xml version="1.0" encoding="utf-8"?>
+<p:sld xmlns:a="http://schemas.openxmlformats.org/drawingml/2006/main" xmlns:r="http://schemas.openxmlformats.org/officeDocument/2006/relationships" xmlns:p="http://schemas.openxmlformats.org/presentationml/2006/main">
+  <p:cSld>
+    <p:spTree>
+      <p:nvGrpSpPr>
+        <p:cNvPr id="1" name=""/>
+        <p:cNvGrpSpPr/>
+        <p:nvPr/>
+      </p:nvGrpSpPr>
+      <p:grpSpPr>
+        <a:xfrm>
+          <a:off x="0" y="0"/>
+          <a:ext cx="0" cy="0"/>
+          <a:chOff x="0" y="0"/>
+          <a:chExt cx="0" cy="0"/>
+        </a:xfrm>
+      </p:grpSpPr>
+      <p:sp>
+        <p:nvSpPr>
+          <p:cNvPr id="3" name="Content Placeholder 2"/>
+          <p:cNvSpPr>
+            <a:spLocks noGrp="1"/>
+          </p:cNvSpPr>
+          <p:nvPr>
+            <p:ph idx="1"/>
+          </p:nvPr>
+        </p:nvSpPr>
+        <p:spPr>
+          <a:xfrm>
+            <a:off x="1" y="811529"/>
+            <a:ext cx="9019308" cy="6036405"/>
+          </a:xfrm>
+        </p:spPr>
+        <p:txBody>
+          <a:bodyPr>
+            <a:normAutofit/>
+          </a:bodyPr>
+          <a:lstStyle/>
+          <a:p>
+            <a:endParaRPr lang="en-US" dirty="0" smtClean="0"/>
+          </a:p>
+          <a:p>
+            <a:pPr lvl="1"/>
+            <a:endParaRPr lang="en-US" dirty="0" smtClean="0"/>
+          </a:p>
+        </p:txBody>
+      </p:sp>
+      <p:sp>
+        <p:nvSpPr>
+          <p:cNvPr id="7" name="Slide Number Placeholder 6"/>
+          <p:cNvSpPr>
+            <a:spLocks noGrp="1"/>
+          </p:cNvSpPr>
+          <p:nvPr>
+            <p:ph type="sldNum" sz="quarter" idx="12"/>
+          </p:nvPr>
+        </p:nvSpPr>
+        <p:spPr/>
+        <p:txBody>
+          <a:bodyPr/>
+          <a:lstStyle/>
+          <a:p>
+            <a:fld id="{F8BDD257-2590-461B-B03B-C03B735556C8}" type="slidenum">
+              <a:rPr lang="en-US" smtClean="0"/>
+              <a:t>12</a:t>
+            </a:fld>
+            <a:endParaRPr lang="en-US"/>
+          </a:p>
+        </p:txBody>
+      </p:sp>
+      <p:sp>
+        <p:nvSpPr>
+          <p:cNvPr id="8" name="Title 1"/>
+          <p:cNvSpPr>
+            <a:spLocks noGrp="1"/>
+          </p:cNvSpPr>
+          <p:nvPr>
+            <p:ph type="title"/>
+          </p:nvPr>
+        </p:nvSpPr>
+        <p:spPr>
+          <a:xfrm>
+            <a:off x="470189" y="14210"/>
+            <a:ext cx="8203622" cy="705875"/>
+          </a:xfrm>
+        </p:spPr>
+        <p:txBody>
+          <a:bodyPr>
+            <a:normAutofit/>
+          </a:bodyPr>
+          <a:lstStyle/>
+          <a:p>
+            <a:pPr algn="ctr"/>
+            <a:r>
+              <a:rPr lang="en-US" dirty="0" smtClean="0"/>
+              <a:t>Overall MDP Tracking Algorithm</a:t>
             </a:r>
             <a:endParaRPr lang="en-US" dirty="0"/>
           </a:p>
@@ -4665,18 +5127,488 @@
         </p:blipFill>
         <p:spPr>
           <a:xfrm>
-            <a:off x="2064991" y="720085"/>
+            <a:off x="1815607" y="668130"/>
             <a:ext cx="5671115" cy="6127849"/>
           </a:xfrm>
           <a:prstGeom prst="rect">
             <a:avLst/>
           </a:prstGeom>
+          <a:ln>
+            <a:solidFill>
+              <a:schemeClr val="tx1"/>
+            </a:solidFill>
+          </a:ln>
         </p:spPr>
       </p:pic>
     </p:spTree>
     <p:extLst>
       <p:ext uri="{BB962C8B-B14F-4D97-AF65-F5344CB8AC3E}">
         <p14:creationId xmlns:p14="http://schemas.microsoft.com/office/powerpoint/2010/main" val="4164128489"/>
+      </p:ext>
+    </p:extLst>
+  </p:cSld>
+  <p:clrMapOvr>
+    <a:masterClrMapping/>
+  </p:clrMapOvr>
+  <p:timing>
+    <p:tnLst>
+      <p:par>
+        <p:cTn id="1" dur="indefinite" restart="never" nodeType="tmRoot"/>
+      </p:par>
+    </p:tnLst>
+  </p:timing>
+</p:sld>
+</file>
+
+<file path=ppt/slides/slide13.xml><?xml version="1.0" encoding="utf-8"?>
+<p:sld xmlns:a="http://schemas.openxmlformats.org/drawingml/2006/main" xmlns:r="http://schemas.openxmlformats.org/officeDocument/2006/relationships" xmlns:p="http://schemas.openxmlformats.org/presentationml/2006/main">
+  <p:cSld>
+    <p:spTree>
+      <p:nvGrpSpPr>
+        <p:cNvPr id="1" name=""/>
+        <p:cNvGrpSpPr/>
+        <p:nvPr/>
+      </p:nvGrpSpPr>
+      <p:grpSpPr>
+        <a:xfrm>
+          <a:off x="0" y="0"/>
+          <a:ext cx="0" cy="0"/>
+          <a:chOff x="0" y="0"/>
+          <a:chExt cx="0" cy="0"/>
+        </a:xfrm>
+      </p:grpSpPr>
+      <p:sp>
+        <p:nvSpPr>
+          <p:cNvPr id="3" name="Content Placeholder 2"/>
+          <p:cNvSpPr>
+            <a:spLocks noGrp="1"/>
+          </p:cNvSpPr>
+          <p:nvPr>
+            <p:ph idx="1"/>
+          </p:nvPr>
+        </p:nvSpPr>
+        <p:spPr>
+          <a:xfrm>
+            <a:off x="1" y="811529"/>
+            <a:ext cx="9019308" cy="6036405"/>
+          </a:xfrm>
+        </p:spPr>
+        <p:txBody>
+          <a:bodyPr>
+            <a:normAutofit/>
+          </a:bodyPr>
+          <a:lstStyle/>
+          <a:p>
+            <a:endParaRPr lang="en-US" dirty="0" smtClean="0"/>
+          </a:p>
+          <a:p>
+            <a:pPr lvl="1"/>
+            <a:endParaRPr lang="en-US" dirty="0" smtClean="0"/>
+          </a:p>
+        </p:txBody>
+      </p:sp>
+      <p:sp>
+        <p:nvSpPr>
+          <p:cNvPr id="7" name="Slide Number Placeholder 6"/>
+          <p:cNvSpPr>
+            <a:spLocks noGrp="1"/>
+          </p:cNvSpPr>
+          <p:nvPr>
+            <p:ph type="sldNum" sz="quarter" idx="12"/>
+          </p:nvPr>
+        </p:nvSpPr>
+        <p:spPr/>
+        <p:txBody>
+          <a:bodyPr/>
+          <a:lstStyle/>
+          <a:p>
+            <a:fld id="{F8BDD257-2590-461B-B03B-C03B735556C8}" type="slidenum">
+              <a:rPr lang="en-US" smtClean="0"/>
+              <a:t>13</a:t>
+            </a:fld>
+            <a:endParaRPr lang="en-US"/>
+          </a:p>
+        </p:txBody>
+      </p:sp>
+      <p:sp>
+        <p:nvSpPr>
+          <p:cNvPr id="8" name="Title 1"/>
+          <p:cNvSpPr>
+            <a:spLocks noGrp="1"/>
+          </p:cNvSpPr>
+          <p:nvPr>
+            <p:ph type="title"/>
+          </p:nvPr>
+        </p:nvSpPr>
+        <p:spPr>
+          <a:xfrm>
+            <a:off x="470189" y="14210"/>
+            <a:ext cx="8203622" cy="705875"/>
+          </a:xfrm>
+        </p:spPr>
+        <p:txBody>
+          <a:bodyPr>
+            <a:normAutofit/>
+          </a:bodyPr>
+          <a:lstStyle/>
+          <a:p>
+            <a:pPr algn="ctr"/>
+            <a:r>
+              <a:rPr lang="en-US" dirty="0" smtClean="0"/>
+              <a:t>Evaluation</a:t>
+            </a:r>
+            <a:endParaRPr lang="en-US" dirty="0"/>
+          </a:p>
+        </p:txBody>
+      </p:sp>
+      <mc:AlternateContent xmlns:mc="http://schemas.openxmlformats.org/markup-compatibility/2006" xmlns:a14="http://schemas.microsoft.com/office/drawing/2010/main">
+        <mc:Choice Requires="a14">
+          <p:sp>
+            <p:nvSpPr>
+              <p:cNvPr id="9" name="Content Placeholder 2"/>
+              <p:cNvSpPr txBox="1">
+                <a:spLocks/>
+              </p:cNvSpPr>
+              <p:nvPr/>
+            </p:nvSpPr>
+            <p:spPr>
+              <a:xfrm>
+                <a:off x="152401" y="963930"/>
+                <a:ext cx="9019308" cy="5392422"/>
+              </a:xfrm>
+              <a:prstGeom prst="rect">
+                <a:avLst/>
+              </a:prstGeom>
+            </p:spPr>
+            <p:txBody>
+              <a:bodyPr vert="horz" lIns="91440" tIns="45720" rIns="91440" bIns="45720" rtlCol="0">
+                <a:normAutofit/>
+              </a:bodyPr>
+              <a:lstStyle>
+                <a:lvl1pPr marL="228600" indent="-228600" algn="l" defTabSz="914400" rtl="0" eaLnBrk="1" latinLnBrk="0" hangingPunct="1">
+                  <a:lnSpc>
+                    <a:spcPct val="90000"/>
+                  </a:lnSpc>
+                  <a:spcBef>
+                    <a:spcPts val="1000"/>
+                  </a:spcBef>
+                  <a:buFont typeface="Arial" panose="020B0604020202020204" pitchFamily="34" charset="0"/>
+                  <a:buChar char="•"/>
+                  <a:defRPr sz="2800" kern="1200">
+                    <a:solidFill>
+                      <a:schemeClr val="tx1"/>
+                    </a:solidFill>
+                    <a:latin typeface="+mn-lt"/>
+                    <a:ea typeface="+mn-ea"/>
+                    <a:cs typeface="+mn-cs"/>
+                  </a:defRPr>
+                </a:lvl1pPr>
+                <a:lvl2pPr marL="685800" indent="-228600" algn="l" defTabSz="914400" rtl="0" eaLnBrk="1" latinLnBrk="0" hangingPunct="1">
+                  <a:lnSpc>
+                    <a:spcPct val="90000"/>
+                  </a:lnSpc>
+                  <a:spcBef>
+                    <a:spcPts val="500"/>
+                  </a:spcBef>
+                  <a:buFont typeface="Arial" panose="020B0604020202020204" pitchFamily="34" charset="0"/>
+                  <a:buChar char="•"/>
+                  <a:defRPr sz="2400" kern="1200">
+                    <a:solidFill>
+                      <a:schemeClr val="tx1"/>
+                    </a:solidFill>
+                    <a:latin typeface="+mn-lt"/>
+                    <a:ea typeface="+mn-ea"/>
+                    <a:cs typeface="+mn-cs"/>
+                  </a:defRPr>
+                </a:lvl2pPr>
+                <a:lvl3pPr marL="1143000" indent="-228600" algn="l" defTabSz="914400" rtl="0" eaLnBrk="1" latinLnBrk="0" hangingPunct="1">
+                  <a:lnSpc>
+                    <a:spcPct val="90000"/>
+                  </a:lnSpc>
+                  <a:spcBef>
+                    <a:spcPts val="500"/>
+                  </a:spcBef>
+                  <a:buFont typeface="Arial" panose="020B0604020202020204" pitchFamily="34" charset="0"/>
+                  <a:buChar char="•"/>
+                  <a:defRPr sz="2000" kern="1200">
+                    <a:solidFill>
+                      <a:schemeClr val="tx1"/>
+                    </a:solidFill>
+                    <a:latin typeface="+mn-lt"/>
+                    <a:ea typeface="+mn-ea"/>
+                    <a:cs typeface="+mn-cs"/>
+                  </a:defRPr>
+                </a:lvl3pPr>
+                <a:lvl4pPr marL="1600200" indent="-228600" algn="l" defTabSz="914400" rtl="0" eaLnBrk="1" latinLnBrk="0" hangingPunct="1">
+                  <a:lnSpc>
+                    <a:spcPct val="90000"/>
+                  </a:lnSpc>
+                  <a:spcBef>
+                    <a:spcPts val="500"/>
+                  </a:spcBef>
+                  <a:buFont typeface="Arial" panose="020B0604020202020204" pitchFamily="34" charset="0"/>
+                  <a:buChar char="•"/>
+                  <a:defRPr sz="1800" kern="1200">
+                    <a:solidFill>
+                      <a:schemeClr val="tx1"/>
+                    </a:solidFill>
+                    <a:latin typeface="+mn-lt"/>
+                    <a:ea typeface="+mn-ea"/>
+                    <a:cs typeface="+mn-cs"/>
+                  </a:defRPr>
+                </a:lvl4pPr>
+                <a:lvl5pPr marL="2057400" indent="-228600" algn="l" defTabSz="914400" rtl="0" eaLnBrk="1" latinLnBrk="0" hangingPunct="1">
+                  <a:lnSpc>
+                    <a:spcPct val="90000"/>
+                  </a:lnSpc>
+                  <a:spcBef>
+                    <a:spcPts val="500"/>
+                  </a:spcBef>
+                  <a:buFont typeface="Arial" panose="020B0604020202020204" pitchFamily="34" charset="0"/>
+                  <a:buChar char="•"/>
+                  <a:defRPr sz="1800" kern="1200">
+                    <a:solidFill>
+                      <a:schemeClr val="tx1"/>
+                    </a:solidFill>
+                    <a:latin typeface="+mn-lt"/>
+                    <a:ea typeface="+mn-ea"/>
+                    <a:cs typeface="+mn-cs"/>
+                  </a:defRPr>
+                </a:lvl5pPr>
+                <a:lvl6pPr marL="2514600" indent="-228600" algn="l" defTabSz="914400" rtl="0" eaLnBrk="1" latinLnBrk="0" hangingPunct="1">
+                  <a:lnSpc>
+                    <a:spcPct val="90000"/>
+                  </a:lnSpc>
+                  <a:spcBef>
+                    <a:spcPts val="500"/>
+                  </a:spcBef>
+                  <a:buFont typeface="Arial" panose="020B0604020202020204" pitchFamily="34" charset="0"/>
+                  <a:buChar char="•"/>
+                  <a:defRPr sz="1800" kern="1200">
+                    <a:solidFill>
+                      <a:schemeClr val="tx1"/>
+                    </a:solidFill>
+                    <a:latin typeface="+mn-lt"/>
+                    <a:ea typeface="+mn-ea"/>
+                    <a:cs typeface="+mn-cs"/>
+                  </a:defRPr>
+                </a:lvl6pPr>
+                <a:lvl7pPr marL="2971800" indent="-228600" algn="l" defTabSz="914400" rtl="0" eaLnBrk="1" latinLnBrk="0" hangingPunct="1">
+                  <a:lnSpc>
+                    <a:spcPct val="90000"/>
+                  </a:lnSpc>
+                  <a:spcBef>
+                    <a:spcPts val="500"/>
+                  </a:spcBef>
+                  <a:buFont typeface="Arial" panose="020B0604020202020204" pitchFamily="34" charset="0"/>
+                  <a:buChar char="•"/>
+                  <a:defRPr sz="1800" kern="1200">
+                    <a:solidFill>
+                      <a:schemeClr val="tx1"/>
+                    </a:solidFill>
+                    <a:latin typeface="+mn-lt"/>
+                    <a:ea typeface="+mn-ea"/>
+                    <a:cs typeface="+mn-cs"/>
+                  </a:defRPr>
+                </a:lvl7pPr>
+                <a:lvl8pPr marL="3429000" indent="-228600" algn="l" defTabSz="914400" rtl="0" eaLnBrk="1" latinLnBrk="0" hangingPunct="1">
+                  <a:lnSpc>
+                    <a:spcPct val="90000"/>
+                  </a:lnSpc>
+                  <a:spcBef>
+                    <a:spcPts val="500"/>
+                  </a:spcBef>
+                  <a:buFont typeface="Arial" panose="020B0604020202020204" pitchFamily="34" charset="0"/>
+                  <a:buChar char="•"/>
+                  <a:defRPr sz="1800" kern="1200">
+                    <a:solidFill>
+                      <a:schemeClr val="tx1"/>
+                    </a:solidFill>
+                    <a:latin typeface="+mn-lt"/>
+                    <a:ea typeface="+mn-ea"/>
+                    <a:cs typeface="+mn-cs"/>
+                  </a:defRPr>
+                </a:lvl8pPr>
+                <a:lvl9pPr marL="3886200" indent="-228600" algn="l" defTabSz="914400" rtl="0" eaLnBrk="1" latinLnBrk="0" hangingPunct="1">
+                  <a:lnSpc>
+                    <a:spcPct val="90000"/>
+                  </a:lnSpc>
+                  <a:spcBef>
+                    <a:spcPts val="500"/>
+                  </a:spcBef>
+                  <a:buFont typeface="Arial" panose="020B0604020202020204" pitchFamily="34" charset="0"/>
+                  <a:buChar char="•"/>
+                  <a:defRPr sz="1800" kern="1200">
+                    <a:solidFill>
+                      <a:schemeClr val="tx1"/>
+                    </a:solidFill>
+                    <a:latin typeface="+mn-lt"/>
+                    <a:ea typeface="+mn-ea"/>
+                    <a:cs typeface="+mn-cs"/>
+                  </a:defRPr>
+                </a:lvl9pPr>
+              </a:lstStyle>
+              <a:p>
+                <a:r>
+                  <a:rPr lang="en-US" dirty="0" smtClean="0"/>
+                  <a:t>Soft margin binary SVM classifier used to generate similarity between target </a:t>
+                </a:r>
+                <a14:m>
+                  <m:oMath xmlns:m="http://schemas.openxmlformats.org/officeDocument/2006/math">
+                    <m:r>
+                      <a:rPr lang="en-US" i="1" smtClean="0">
+                        <a:latin typeface="Cambria Math" panose="02040503050406030204" pitchFamily="18" charset="0"/>
+                      </a:rPr>
+                      <m:t>𝑡</m:t>
+                    </m:r>
+                  </m:oMath>
+                </a14:m>
+                <a:r>
+                  <a:rPr lang="en-US" dirty="0" smtClean="0"/>
+                  <a:t> and detection </a:t>
+                </a:r>
+                <a14:m>
+                  <m:oMath xmlns:m="http://schemas.openxmlformats.org/officeDocument/2006/math">
+                    <m:r>
+                      <a:rPr lang="en-US" i="1" smtClean="0">
+                        <a:latin typeface="Cambria Math" panose="02040503050406030204" pitchFamily="18" charset="0"/>
+                      </a:rPr>
+                      <m:t>𝑑</m:t>
+                    </m:r>
+                  </m:oMath>
+                </a14:m>
+                <a:endParaRPr lang="en-US" dirty="0" smtClean="0"/>
+              </a:p>
+              <a:p>
+                <a:endParaRPr lang="en-US" dirty="0" smtClean="0"/>
+              </a:p>
+              <a:p>
+                <a:r>
+                  <a:rPr lang="en-US" dirty="0" smtClean="0"/>
+                  <a:t>SVM is trained using RL</a:t>
+                </a:r>
+              </a:p>
+              <a:p>
+                <a:pPr lvl="1">
+                  <a:buFont typeface="Courier New" panose="02070309020205020404" pitchFamily="49" charset="0"/>
+                  <a:buChar char="o"/>
+                </a:pPr>
+                <a:r>
+                  <a:rPr lang="en-US" dirty="0" smtClean="0"/>
+                  <a:t>Use existing classifier to track objects on training sequences</a:t>
+                </a:r>
+              </a:p>
+              <a:p>
+                <a:pPr lvl="1">
+                  <a:buFont typeface="Courier New" panose="02070309020205020404" pitchFamily="49" charset="0"/>
+                  <a:buChar char="o"/>
+                </a:pPr>
+                <a:r>
+                  <a:rPr lang="en-US" dirty="0" smtClean="0"/>
+                  <a:t>Update whenever it makes a mistake in data association </a:t>
+                </a:r>
+              </a:p>
+              <a:p>
+                <a:r>
+                  <a:rPr lang="en-US" dirty="0" smtClean="0"/>
+                  <a:t>Two types of mistakes:</a:t>
+                </a:r>
+              </a:p>
+              <a:p>
+                <a:pPr lvl="1">
+                  <a:buFont typeface="Courier New" panose="02070309020205020404" pitchFamily="49" charset="0"/>
+                  <a:buChar char="o"/>
+                </a:pPr>
+                <a:r>
+                  <a:rPr lang="en-US" dirty="0" smtClean="0"/>
+                  <a:t>Target is incorrectly associated to a detection - add as </a:t>
+                </a:r>
+                <a:r>
+                  <a:rPr lang="en-US" b="1" dirty="0" smtClean="0"/>
+                  <a:t>negative</a:t>
+                </a:r>
+                <a:r>
+                  <a:rPr lang="en-US" dirty="0" smtClean="0"/>
+                  <a:t> training example</a:t>
+                </a:r>
+              </a:p>
+              <a:p>
+                <a:pPr lvl="1">
+                  <a:buFont typeface="Courier New" panose="02070309020205020404" pitchFamily="49" charset="0"/>
+                  <a:buChar char="o"/>
+                </a:pPr>
+                <a:r>
+                  <a:rPr lang="en-US" dirty="0" smtClean="0"/>
+                  <a:t>Target is not associated with any detection but is visible and detected correctly –  add as </a:t>
+                </a:r>
+                <a:r>
+                  <a:rPr lang="en-US" b="1" dirty="0" smtClean="0"/>
+                  <a:t>positive</a:t>
+                </a:r>
+                <a:r>
+                  <a:rPr lang="en-US" dirty="0" smtClean="0"/>
+                  <a:t> training example</a:t>
+                </a:r>
+              </a:p>
+              <a:p>
+                <a:r>
+                  <a:rPr lang="en-US" dirty="0" smtClean="0"/>
+                  <a:t>Equivalent reward function:</a:t>
+                </a:r>
+              </a:p>
+              <a:p>
+                <a:endParaRPr lang="en-US" dirty="0" smtClean="0"/>
+              </a:p>
+              <a:p>
+                <a:pPr lvl="1"/>
+                <a:endParaRPr lang="en-US" dirty="0" smtClean="0"/>
+              </a:p>
+            </p:txBody>
+          </p:sp>
+        </mc:Choice>
+        <mc:Fallback xmlns="">
+          <p:sp>
+            <p:nvSpPr>
+              <p:cNvPr id="9" name="Content Placeholder 2"/>
+              <p:cNvSpPr txBox="1">
+                <a:spLocks noRot="1" noChangeAspect="1" noMove="1" noResize="1" noEditPoints="1" noAdjustHandles="1" noChangeArrowheads="1" noChangeShapeType="1" noTextEdit="1"/>
+              </p:cNvSpPr>
+              <p:nvPr/>
+            </p:nvSpPr>
+            <p:spPr>
+              <a:xfrm>
+                <a:off x="152401" y="963930"/>
+                <a:ext cx="9019308" cy="5392422"/>
+              </a:xfrm>
+              <a:prstGeom prst="rect">
+                <a:avLst/>
+              </a:prstGeom>
+              <a:blipFill rotWithShape="0">
+                <a:blip r:embed="rId3"/>
+                <a:stretch>
+                  <a:fillRect l="-1216" t="-1808"/>
+                </a:stretch>
+              </a:blipFill>
+            </p:spPr>
+            <p:txBody>
+              <a:bodyPr/>
+              <a:lstStyle/>
+              <a:p>
+                <a:r>
+                  <a:rPr lang="en-US">
+                    <a:noFill/>
+                  </a:rPr>
+                  <a:t> </a:t>
+                </a:r>
+              </a:p>
+            </p:txBody>
+          </p:sp>
+        </mc:Fallback>
+      </mc:AlternateContent>
+    </p:spTree>
+    <p:extLst>
+      <p:ext uri="{BB962C8B-B14F-4D97-AF65-F5344CB8AC3E}">
+        <p14:creationId xmlns:p14="http://schemas.microsoft.com/office/powerpoint/2010/main" val="1417188092"/>
       </p:ext>
     </p:extLst>
   </p:cSld>
@@ -5083,7 +6015,7 @@
             </a:r>
             <a:r>
               <a:rPr lang="en-US" b="1" dirty="0" smtClean="0"/>
-              <a:t>Tracked</a:t>
+              <a:t>tracked</a:t>
             </a:r>
             <a:r>
               <a:rPr lang="en-US" dirty="0" smtClean="0"/>
@@ -5098,8 +6030,12 @@
               <a:t>) or </a:t>
             </a:r>
             <a:r>
+              <a:rPr lang="en-US" b="1" dirty="0"/>
+              <a:t>i</a:t>
+            </a:r>
+            <a:r>
               <a:rPr lang="en-US" b="1" dirty="0" smtClean="0"/>
-              <a:t>Inactive</a:t>
+              <a:t>nactive</a:t>
             </a:r>
             <a:r>
               <a:rPr lang="en-US" dirty="0" smtClean="0"/>
@@ -5327,8 +6263,8 @@
         </p:nvSpPr>
         <p:spPr>
           <a:xfrm>
-            <a:off x="290945" y="811529"/>
-            <a:ext cx="8541327" cy="6036405"/>
+            <a:off x="290945" y="811530"/>
+            <a:ext cx="8541327" cy="5544822"/>
           </a:xfrm>
         </p:spPr>
         <p:txBody>
@@ -5418,8 +6354,12 @@
           <a:p>
             <a:pPr lvl="1"/>
             <a:r>
+              <a:rPr lang="en-US" b="1" dirty="0" smtClean="0"/>
+              <a:t>TLD</a:t>
+            </a:r>
+            <a:r>
               <a:rPr lang="en-US" dirty="0" smtClean="0"/>
-              <a:t>TLD used here</a:t>
+              <a:t> used here</a:t>
             </a:r>
           </a:p>
           <a:p>
@@ -5449,7 +6389,7 @@
         </p:blipFill>
         <p:spPr>
           <a:xfrm>
-            <a:off x="2076751" y="1763731"/>
+            <a:off x="2076751" y="1774122"/>
             <a:ext cx="4990499" cy="3691768"/>
           </a:xfrm>
           <a:prstGeom prst="rect">
@@ -5577,8 +6517,12 @@
           </a:p>
           <a:p>
             <a:r>
+              <a:rPr lang="en-US" b="1" dirty="0" smtClean="0"/>
+              <a:t>Optical flow</a:t>
+            </a:r>
+            <a:r>
               <a:rPr lang="en-US" dirty="0" smtClean="0"/>
-              <a:t>Optical flow of densely uniformly sampled points in template</a:t>
+              <a:t> of densely uniformly sampled points in template</a:t>
             </a:r>
           </a:p>
           <a:p>
@@ -5602,7 +6546,15 @@
           <a:p>
             <a:r>
               <a:rPr lang="en-US" dirty="0" smtClean="0"/>
-              <a:t>Forward - Backward (FB) estimation used to estimate stability</a:t>
+              <a:t>Forward - Backward (</a:t>
+            </a:r>
+            <a:r>
+              <a:rPr lang="en-US" b="1" dirty="0" smtClean="0"/>
+              <a:t>FB</a:t>
+            </a:r>
+            <a:r>
+              <a:rPr lang="en-US" dirty="0" smtClean="0"/>
+              <a:t>) estimation used to estimate stability</a:t>
             </a:r>
           </a:p>
           <a:p>
@@ -5634,7 +6586,15 @@
             </a:pPr>
             <a:r>
               <a:rPr lang="en-US" dirty="0"/>
-              <a:t>Used as target history for data </a:t>
+              <a:t>Used as target </a:t>
+            </a:r>
+            <a:r>
+              <a:rPr lang="en-US" b="1" dirty="0"/>
+              <a:t>history </a:t>
+            </a:r>
+            <a:r>
+              <a:rPr lang="en-US" dirty="0"/>
+              <a:t>for data </a:t>
             </a:r>
             <a:r>
               <a:rPr lang="en-US" dirty="0" smtClean="0"/>
@@ -5643,8 +6603,12 @@
           </a:p>
           <a:p>
             <a:r>
+              <a:rPr lang="en-US" b="1" dirty="0" smtClean="0"/>
+              <a:t>Lazy</a:t>
+            </a:r>
+            <a:r>
               <a:rPr lang="en-US" dirty="0" smtClean="0"/>
-              <a:t>Lazy update</a:t>
+              <a:t> update</a:t>
             </a:r>
           </a:p>
           <a:p>
@@ -5708,7 +6672,7 @@
               <a:rPr lang="en-US" smtClean="0"/>
               <a:t>6</a:t>
             </a:fld>
-            <a:endParaRPr lang="en-US"/>
+            <a:endParaRPr lang="en-US" dirty="0"/>
           </a:p>
         </p:txBody>
       </p:sp>
@@ -5762,7 +6726,7 @@
         <p:spPr>
           <a:xfrm>
             <a:off x="290945" y="1044806"/>
-            <a:ext cx="8541327" cy="4768388"/>
+            <a:ext cx="8541327" cy="5676670"/>
           </a:xfrm>
         </p:spPr>
         <p:txBody>
@@ -5786,7 +6750,15 @@
             <a:pPr lvl="1"/>
             <a:r>
               <a:rPr lang="en-US" dirty="0" smtClean="0"/>
-              <a:t>Euclidean distance between initial and FB prediction</a:t>
+              <a:t>Euclidean distance between </a:t>
+            </a:r>
+            <a:r>
+              <a:rPr lang="en-US" smtClean="0"/>
+              <a:t>initial point </a:t>
+            </a:r>
+            <a:r>
+              <a:rPr lang="en-US" dirty="0" smtClean="0"/>
+              <a:t>and FB prediction</a:t>
             </a:r>
           </a:p>
           <a:p>
@@ -5846,7 +6818,7 @@
               <a:rPr lang="en-US" smtClean="0"/>
               <a:t>7</a:t>
             </a:fld>
-            <a:endParaRPr lang="en-US"/>
+            <a:endParaRPr lang="en-US" dirty="0"/>
           </a:p>
         </p:txBody>
       </p:sp>
@@ -5872,8 +6844,8 @@
         </p:blipFill>
         <p:spPr>
           <a:xfrm>
-            <a:off x="1768171" y="4706392"/>
-            <a:ext cx="5607658" cy="987825"/>
+            <a:off x="1430469" y="4716783"/>
+            <a:ext cx="6283063" cy="1106802"/>
           </a:xfrm>
           <a:prstGeom prst="rect">
             <a:avLst/>
@@ -5892,13 +6864,13 @@
         </p:nvSpPr>
         <p:spPr>
           <a:xfrm>
-            <a:off x="470189" y="14210"/>
-            <a:ext cx="8203622" cy="705875"/>
+            <a:off x="0" y="14210"/>
+            <a:ext cx="9144000" cy="705875"/>
           </a:xfrm>
         </p:spPr>
         <p:txBody>
           <a:bodyPr>
-            <a:normAutofit fontScale="90000"/>
+            <a:normAutofit/>
           </a:bodyPr>
           <a:lstStyle/>
           <a:p>
@@ -5977,8 +6949,8 @@
           </a:p>
         </p:txBody>
       </p:sp>
-      <mc:AlternateContent xmlns:mc="http://schemas.openxmlformats.org/markup-compatibility/2006">
-        <mc:Choice xmlns:a14="http://schemas.microsoft.com/office/drawing/2010/main" Requires="a14">
+      <mc:AlternateContent xmlns:mc="http://schemas.openxmlformats.org/markup-compatibility/2006" xmlns:a14="http://schemas.microsoft.com/office/drawing/2010/main">
+        <mc:Choice Requires="a14">
           <p:sp>
             <p:nvSpPr>
               <p:cNvPr id="3" name="Content Placeholder 2"/>
@@ -6130,7 +7102,7 @@
             </p:txBody>
           </p:sp>
         </mc:Choice>
-        <mc:Fallback>
+        <mc:Fallback xmlns="">
           <p:sp>
             <p:nvSpPr>
               <p:cNvPr id="3" name="Content Placeholder 2"/>
@@ -6258,63 +7230,185 @@
           <a:chExt cx="0" cy="0"/>
         </a:xfrm>
       </p:grpSpPr>
-      <p:sp>
-        <p:nvSpPr>
-          <p:cNvPr id="3" name="Content Placeholder 2"/>
-          <p:cNvSpPr>
-            <a:spLocks noGrp="1"/>
-          </p:cNvSpPr>
-          <p:nvPr>
-            <p:ph idx="1"/>
-          </p:nvPr>
-        </p:nvSpPr>
-        <p:spPr>
-          <a:xfrm>
-            <a:off x="1" y="811529"/>
-            <a:ext cx="9019308" cy="6036405"/>
-          </a:xfrm>
-        </p:spPr>
-        <p:txBody>
-          <a:bodyPr>
-            <a:normAutofit/>
-          </a:bodyPr>
-          <a:lstStyle/>
-          <a:p>
-            <a:r>
-              <a:rPr lang="en-US" dirty="0" smtClean="0"/>
-              <a:t>Soft margin binary SVM classifier used to generate similarity between target t and detection d</a:t>
-            </a:r>
-          </a:p>
-          <a:p>
-            <a:endParaRPr lang="en-US" dirty="0" smtClean="0"/>
-          </a:p>
-          <a:p>
-            <a:endParaRPr lang="en-US" dirty="0" smtClean="0"/>
-          </a:p>
-          <a:p>
-            <a:r>
-              <a:rPr lang="en-US" dirty="0" smtClean="0"/>
-              <a:t>SVM is trained learned using RL</a:t>
-            </a:r>
-          </a:p>
-          <a:p>
-            <a:endParaRPr lang="en-US" dirty="0" smtClean="0"/>
-          </a:p>
-          <a:p>
-            <a:r>
-              <a:rPr lang="en-US" dirty="0" smtClean="0"/>
-              <a:t>Equivalent reward function:</a:t>
-            </a:r>
-          </a:p>
-          <a:p>
-            <a:endParaRPr lang="en-US" dirty="0" smtClean="0"/>
-          </a:p>
-          <a:p>
-            <a:pPr lvl="1"/>
-            <a:endParaRPr lang="en-US" dirty="0" smtClean="0"/>
-          </a:p>
-        </p:txBody>
-      </p:sp>
+      <mc:AlternateContent xmlns:mc="http://schemas.openxmlformats.org/markup-compatibility/2006" xmlns:a14="http://schemas.microsoft.com/office/drawing/2010/main">
+        <mc:Choice Requires="a14">
+          <p:sp>
+            <p:nvSpPr>
+              <p:cNvPr id="3" name="Content Placeholder 2"/>
+              <p:cNvSpPr>
+                <a:spLocks noGrp="1"/>
+              </p:cNvSpPr>
+              <p:nvPr>
+                <p:ph idx="1"/>
+              </p:nvPr>
+            </p:nvSpPr>
+            <p:spPr>
+              <a:xfrm>
+                <a:off x="1" y="811529"/>
+                <a:ext cx="9019308" cy="6036405"/>
+              </a:xfrm>
+            </p:spPr>
+            <p:txBody>
+              <a:bodyPr>
+                <a:normAutofit/>
+              </a:bodyPr>
+              <a:lstStyle/>
+              <a:p>
+                <a:r>
+                  <a:rPr lang="en-US" dirty="0" smtClean="0"/>
+                  <a:t>Soft margin binary SVM classifier used to generate similarity between target </a:t>
+                </a:r>
+                <a14:m>
+                  <m:oMath xmlns:m="http://schemas.openxmlformats.org/officeDocument/2006/math">
+                    <m:r>
+                      <a:rPr lang="en-US" b="0" i="1" smtClean="0">
+                        <a:latin typeface="Cambria Math" panose="02040503050406030204" pitchFamily="18" charset="0"/>
+                      </a:rPr>
+                      <m:t>𝑡</m:t>
+                    </m:r>
+                  </m:oMath>
+                </a14:m>
+                <a:r>
+                  <a:rPr lang="en-US" dirty="0" smtClean="0"/>
+                  <a:t> and detection </a:t>
+                </a:r>
+                <a14:m>
+                  <m:oMath xmlns:m="http://schemas.openxmlformats.org/officeDocument/2006/math">
+                    <m:r>
+                      <a:rPr lang="en-US" b="0" i="1" smtClean="0">
+                        <a:latin typeface="Cambria Math" panose="02040503050406030204" pitchFamily="18" charset="0"/>
+                      </a:rPr>
+                      <m:t>𝑑</m:t>
+                    </m:r>
+                  </m:oMath>
+                </a14:m>
+                <a:endParaRPr lang="en-US" dirty="0" smtClean="0"/>
+              </a:p>
+              <a:p>
+                <a:endParaRPr lang="en-US" dirty="0" smtClean="0"/>
+              </a:p>
+              <a:p>
+                <a:r>
+                  <a:rPr lang="en-US" dirty="0" smtClean="0"/>
+                  <a:t>SVM is trained using RL</a:t>
+                </a:r>
+              </a:p>
+              <a:p>
+                <a:pPr lvl="1">
+                  <a:buFont typeface="Courier New" panose="02070309020205020404" pitchFamily="49" charset="0"/>
+                  <a:buChar char="o"/>
+                </a:pPr>
+                <a:r>
+                  <a:rPr lang="en-US" dirty="0" smtClean="0"/>
+                  <a:t>Use existing classifier to track objects on training sequences</a:t>
+                </a:r>
+              </a:p>
+              <a:p>
+                <a:pPr lvl="1">
+                  <a:buFont typeface="Courier New" panose="02070309020205020404" pitchFamily="49" charset="0"/>
+                  <a:buChar char="o"/>
+                </a:pPr>
+                <a:r>
+                  <a:rPr lang="en-US" dirty="0" smtClean="0"/>
+                  <a:t>Update whenever it makes a mistake in data association </a:t>
+                </a:r>
+              </a:p>
+              <a:p>
+                <a:r>
+                  <a:rPr lang="en-US" dirty="0" smtClean="0"/>
+                  <a:t>Two types of mistakes:</a:t>
+                </a:r>
+              </a:p>
+              <a:p>
+                <a:pPr lvl="1">
+                  <a:buFont typeface="Courier New" panose="02070309020205020404" pitchFamily="49" charset="0"/>
+                  <a:buChar char="o"/>
+                </a:pPr>
+                <a:r>
+                  <a:rPr lang="en-US" dirty="0" smtClean="0"/>
+                  <a:t>Target is incorrectly associated to a detection - add as </a:t>
+                </a:r>
+                <a:r>
+                  <a:rPr lang="en-US" b="1" dirty="0" smtClean="0"/>
+                  <a:t>negative</a:t>
+                </a:r>
+                <a:r>
+                  <a:rPr lang="en-US" dirty="0" smtClean="0"/>
+                  <a:t> training example</a:t>
+                </a:r>
+              </a:p>
+              <a:p>
+                <a:pPr lvl="1">
+                  <a:buFont typeface="Courier New" panose="02070309020205020404" pitchFamily="49" charset="0"/>
+                  <a:buChar char="o"/>
+                </a:pPr>
+                <a:r>
+                  <a:rPr lang="en-US" dirty="0" smtClean="0"/>
+                  <a:t>Target is not associated with any detection but is visible and detected correctly –  add as </a:t>
+                </a:r>
+                <a:r>
+                  <a:rPr lang="en-US" b="1" dirty="0" smtClean="0"/>
+                  <a:t>positive</a:t>
+                </a:r>
+                <a:r>
+                  <a:rPr lang="en-US" dirty="0" smtClean="0"/>
+                  <a:t> training example</a:t>
+                </a:r>
+              </a:p>
+              <a:p>
+                <a:r>
+                  <a:rPr lang="en-US" dirty="0" smtClean="0"/>
+                  <a:t>Equivalent reward function:</a:t>
+                </a:r>
+              </a:p>
+              <a:p>
+                <a:endParaRPr lang="en-US" dirty="0" smtClean="0"/>
+              </a:p>
+              <a:p>
+                <a:pPr lvl="1"/>
+                <a:endParaRPr lang="en-US" dirty="0" smtClean="0"/>
+              </a:p>
+            </p:txBody>
+          </p:sp>
+        </mc:Choice>
+        <mc:Fallback xmlns="">
+          <p:sp>
+            <p:nvSpPr>
+              <p:cNvPr id="3" name="Content Placeholder 2"/>
+              <p:cNvSpPr>
+                <a:spLocks noGrp="1" noRot="1" noChangeAspect="1" noMove="1" noResize="1" noEditPoints="1" noAdjustHandles="1" noChangeArrowheads="1" noChangeShapeType="1" noTextEdit="1"/>
+              </p:cNvSpPr>
+              <p:nvPr>
+                <p:ph idx="1"/>
+              </p:nvPr>
+            </p:nvSpPr>
+            <p:spPr>
+              <a:xfrm>
+                <a:off x="1" y="811529"/>
+                <a:ext cx="9019308" cy="6036405"/>
+              </a:xfrm>
+              <a:blipFill rotWithShape="0">
+                <a:blip r:embed="rId3"/>
+                <a:stretch>
+                  <a:fillRect l="-1216" t="-1616"/>
+                </a:stretch>
+              </a:blipFill>
+            </p:spPr>
+            <p:txBody>
+              <a:bodyPr/>
+              <a:lstStyle/>
+              <a:p>
+                <a:r>
+                  <a:rPr lang="en-US">
+                    <a:noFill/>
+                  </a:rPr>
+                  <a:t> </a:t>
+                </a:r>
+              </a:p>
+            </p:txBody>
+          </p:sp>
+        </mc:Fallback>
+      </mc:AlternateContent>
       <p:sp>
         <p:nvSpPr>
           <p:cNvPr id="7" name="Slide Number Placeholder 6"/>
@@ -6378,7 +7472,7 @@
           <p:nvPr/>
         </p:nvPicPr>
         <p:blipFill>
-          <a:blip r:embed="rId3" cstate="print">
+          <a:blip r:embed="rId4" cstate="print">
             <a:extLst>
               <a:ext uri="{28A0092B-C50C-407E-A947-70E740481C1C}">
                 <a14:useLocalDpi xmlns:a14="http://schemas.microsoft.com/office/drawing/2010/main" val="0"/>
@@ -6408,7 +7502,7 @@
           <p:nvPr/>
         </p:nvPicPr>
         <p:blipFill>
-          <a:blip r:embed="rId4">
+          <a:blip r:embed="rId5">
             <a:extLst>
               <a:ext uri="{28A0092B-C50C-407E-A947-70E740481C1C}">
                 <a14:useLocalDpi xmlns:a14="http://schemas.microsoft.com/office/drawing/2010/main" val="0"/>
@@ -6421,8 +7515,8 @@
         </p:blipFill>
         <p:spPr>
           <a:xfrm>
-            <a:off x="470189" y="4189029"/>
-            <a:ext cx="4476932" cy="559616"/>
+            <a:off x="608642" y="5994163"/>
+            <a:ext cx="5569117" cy="696139"/>
           </a:xfrm>
           <a:prstGeom prst="rect">
             <a:avLst/>

</xml_diff>

<commit_message>
minor fix in ppt
</commit_message>
<xml_diff>
--- a/Tracking/17_5_22 Learning to Track Online Multi-object Tracking by Decision Making  iccv15/mdp_tracking.pptx
+++ b/Tracking/17_5_22 Learning to Track Online Multi-object Tracking by Decision Making  iccv15/mdp_tracking.pptx
@@ -6309,7 +6309,7 @@
 </file>
 
 <file path=ppt/slides/slide15.xml><?xml version="1.0" encoding="utf-8"?>
-<p:sld xmlns:a="http://schemas.openxmlformats.org/drawingml/2006/main" xmlns:r="http://schemas.openxmlformats.org/officeDocument/2006/relationships" xmlns:p="http://schemas.openxmlformats.org/presentationml/2006/main">
+<p:sld xmlns:a="http://schemas.openxmlformats.org/drawingml/2006/main" xmlns:r="http://schemas.openxmlformats.org/officeDocument/2006/relationships" xmlns:p="http://schemas.openxmlformats.org/presentationml/2006/main" show="0">
   <p:cSld>
     <p:spTree>
       <p:nvGrpSpPr>
@@ -6424,6 +6424,14 @@
   <p:clrMapOvr>
     <a:masterClrMapping/>
   </p:clrMapOvr>
+  <mc:AlternateContent xmlns:mc="http://schemas.openxmlformats.org/markup-compatibility/2006">
+    <mc:Choice xmlns:p14="http://schemas.microsoft.com/office/powerpoint/2010/main" Requires="p14">
+      <p:transition spd="slow" p14:dur="2000"/>
+    </mc:Choice>
+    <mc:Fallback>
+      <p:transition spd="slow"/>
+    </mc:Fallback>
+  </mc:AlternateContent>
   <p:timing>
     <p:tnLst>
       <p:par>

</xml_diff>

<commit_message>
completed datasets and the first validation slide;
</commit_message>
<xml_diff>
--- a/Tracking/17_5_22 Learning to Track Online Multi-object Tracking by Decision Making  iccv15/mdp_tracking.pptx
+++ b/Tracking/17_5_22 Learning to Track Online Multi-object Tracking by Decision Making  iccv15/mdp_tracking.pptx
@@ -5,7 +5,7 @@
     <p:sldMasterId id="2147483660" r:id="rId1"/>
   </p:sldMasterIdLst>
   <p:notesMasterIdLst>
-    <p:notesMasterId r:id="rId17"/>
+    <p:notesMasterId r:id="rId18"/>
   </p:notesMasterIdLst>
   <p:sldIdLst>
     <p:sldId id="256" r:id="rId2"/>
@@ -23,6 +23,7 @@
     <p:sldId id="268" r:id="rId14"/>
     <p:sldId id="272" r:id="rId15"/>
     <p:sldId id="271" r:id="rId16"/>
+    <p:sldId id="273" r:id="rId17"/>
   </p:sldIdLst>
   <p:sldSz cx="9144000" cy="6858000" type="screen4x3"/>
   <p:notesSz cx="6858000" cy="9144000"/>
@@ -211,7 +212,7 @@
           <a:p>
             <a:fld id="{C814CC01-F667-4176-984F-DEC6FB413561}" type="datetimeFigureOut">
               <a:rPr lang="en-US" smtClean="0"/>
-              <a:t>5/21/2017</a:t>
+              <a:t>5/22/2017</a:t>
             </a:fld>
             <a:endParaRPr lang="en-US"/>
           </a:p>
@@ -775,6 +776,30 @@
           <a:bodyPr/>
           <a:lstStyle/>
           <a:p>
+            <a:r>
+              <a:rPr lang="en-US" dirty="0" smtClean="0"/>
+              <a:t>For all test sequences</a:t>
+            </a:r>
+            <a:r>
+              <a:rPr lang="en-US" baseline="0" dirty="0" smtClean="0"/>
+              <a:t> except AVG town </a:t>
+            </a:r>
+            <a:r>
+              <a:rPr lang="en-US" baseline="0" dirty="0" err="1" smtClean="0"/>
+              <a:t>centre</a:t>
+            </a:r>
+            <a:r>
+              <a:rPr lang="en-US" baseline="0" dirty="0" smtClean="0"/>
+              <a:t>, there are training sequences captured in similar scenario as indicated by the naming of the sequences;</a:t>
+            </a:r>
+          </a:p>
+          <a:p>
+            <a:r>
+              <a:rPr lang="en-US" baseline="0" dirty="0" smtClean="0"/>
+              <a:t>This can allow us to learn meaningful characteristics from training sequences and use them for testing;</a:t>
+            </a:r>
+          </a:p>
+          <a:p>
             <a:endParaRPr lang="en-US" dirty="0"/>
           </a:p>
         </p:txBody>
@@ -974,6 +999,114 @@
     <p:extLst>
       <p:ext uri="{BB962C8B-B14F-4D97-AF65-F5344CB8AC3E}">
         <p14:creationId xmlns:p14="http://schemas.microsoft.com/office/powerpoint/2010/main" val="1314062304"/>
+      </p:ext>
+    </p:extLst>
+  </p:cSld>
+  <p:clrMapOvr>
+    <a:masterClrMapping/>
+  </p:clrMapOvr>
+</p:notes>
+</file>
+
+<file path=ppt/notesSlides/notesSlide15.xml><?xml version="1.0" encoding="utf-8"?>
+<p:notes xmlns:a="http://schemas.openxmlformats.org/drawingml/2006/main" xmlns:r="http://schemas.openxmlformats.org/officeDocument/2006/relationships" xmlns:p="http://schemas.openxmlformats.org/presentationml/2006/main">
+  <p:cSld>
+    <p:spTree>
+      <p:nvGrpSpPr>
+        <p:cNvPr id="1" name=""/>
+        <p:cNvGrpSpPr/>
+        <p:nvPr/>
+      </p:nvGrpSpPr>
+      <p:grpSpPr>
+        <a:xfrm>
+          <a:off x="0" y="0"/>
+          <a:ext cx="0" cy="0"/>
+          <a:chOff x="0" y="0"/>
+          <a:chExt cx="0" cy="0"/>
+        </a:xfrm>
+      </p:grpSpPr>
+      <p:sp>
+        <p:nvSpPr>
+          <p:cNvPr id="2" name="Slide Image Placeholder 1"/>
+          <p:cNvSpPr>
+            <a:spLocks noGrp="1" noRot="1" noChangeAspect="1"/>
+          </p:cNvSpPr>
+          <p:nvPr>
+            <p:ph type="sldImg"/>
+          </p:nvPr>
+        </p:nvSpPr>
+        <p:spPr/>
+      </p:sp>
+      <p:sp>
+        <p:nvSpPr>
+          <p:cNvPr id="3" name="Notes Placeholder 2"/>
+          <p:cNvSpPr>
+            <a:spLocks noGrp="1"/>
+          </p:cNvSpPr>
+          <p:nvPr>
+            <p:ph type="body" idx="1"/>
+          </p:nvPr>
+        </p:nvSpPr>
+        <p:spPr/>
+        <p:txBody>
+          <a:bodyPr/>
+          <a:lstStyle/>
+          <a:p>
+            <a:r>
+              <a:rPr lang="en-US" dirty="0" smtClean="0"/>
+              <a:t>For all test sequences</a:t>
+            </a:r>
+            <a:r>
+              <a:rPr lang="en-US" baseline="0" dirty="0" smtClean="0"/>
+              <a:t> except AVG town </a:t>
+            </a:r>
+            <a:r>
+              <a:rPr lang="en-US" baseline="0" dirty="0" err="1" smtClean="0"/>
+              <a:t>centre</a:t>
+            </a:r>
+            <a:r>
+              <a:rPr lang="en-US" baseline="0" dirty="0" smtClean="0"/>
+              <a:t>, there are training sequences captured in similar scenario as indicated by the naming of the sequences;</a:t>
+            </a:r>
+          </a:p>
+          <a:p>
+            <a:r>
+              <a:rPr lang="en-US" baseline="0" dirty="0" smtClean="0"/>
+              <a:t>This can allow us to learn meaningful characteristics from training sequences and use them for testing;</a:t>
+            </a:r>
+          </a:p>
+          <a:p>
+            <a:endParaRPr lang="en-US" dirty="0"/>
+          </a:p>
+        </p:txBody>
+      </p:sp>
+      <p:sp>
+        <p:nvSpPr>
+          <p:cNvPr id="4" name="Slide Number Placeholder 3"/>
+          <p:cNvSpPr>
+            <a:spLocks noGrp="1"/>
+          </p:cNvSpPr>
+          <p:nvPr>
+            <p:ph type="sldNum" sz="quarter" idx="10"/>
+          </p:nvPr>
+        </p:nvSpPr>
+        <p:spPr/>
+        <p:txBody>
+          <a:bodyPr/>
+          <a:lstStyle/>
+          <a:p>
+            <a:fld id="{6D44A11D-680A-4E92-AD72-187D8DFAA3A6}" type="slidenum">
+              <a:rPr lang="en-US" smtClean="0"/>
+              <a:t>16</a:t>
+            </a:fld>
+            <a:endParaRPr lang="en-US"/>
+          </a:p>
+        </p:txBody>
+      </p:sp>
+    </p:spTree>
+    <p:extLst>
+      <p:ext uri="{BB962C8B-B14F-4D97-AF65-F5344CB8AC3E}">
+        <p14:creationId xmlns:p14="http://schemas.microsoft.com/office/powerpoint/2010/main" val="1662869659"/>
       </p:ext>
     </p:extLst>
   </p:cSld>
@@ -1911,7 +2044,7 @@
           <a:p>
             <a:fld id="{6438C68C-2F39-4207-9B04-F32E15BD6210}" type="datetime1">
               <a:rPr lang="en-US" smtClean="0"/>
-              <a:t>5/21/2017</a:t>
+              <a:t>5/22/2017</a:t>
             </a:fld>
             <a:endParaRPr lang="en-US"/>
           </a:p>
@@ -2081,7 +2214,7 @@
           <a:p>
             <a:fld id="{9D993564-71E5-4F9C-AC03-E90716D7F9D6}" type="datetime1">
               <a:rPr lang="en-US" smtClean="0"/>
-              <a:t>5/21/2017</a:t>
+              <a:t>5/22/2017</a:t>
             </a:fld>
             <a:endParaRPr lang="en-US"/>
           </a:p>
@@ -2261,7 +2394,7 @@
           <a:p>
             <a:fld id="{D33012D3-0AB2-4C62-9209-9EA65255FB20}" type="datetime1">
               <a:rPr lang="en-US" smtClean="0"/>
-              <a:t>5/21/2017</a:t>
+              <a:t>5/22/2017</a:t>
             </a:fld>
             <a:endParaRPr lang="en-US"/>
           </a:p>
@@ -2431,7 +2564,7 @@
           <a:p>
             <a:fld id="{0C4C4FC8-782C-4E38-BB92-0A96BFF0C83A}" type="datetime1">
               <a:rPr lang="en-US" smtClean="0"/>
-              <a:t>5/21/2017</a:t>
+              <a:t>5/22/2017</a:t>
             </a:fld>
             <a:endParaRPr lang="en-US"/>
           </a:p>
@@ -2675,7 +2808,7 @@
           <a:p>
             <a:fld id="{023F1F50-6DAA-43AF-8D5C-3201D732D401}" type="datetime1">
               <a:rPr lang="en-US" smtClean="0"/>
-              <a:t>5/21/2017</a:t>
+              <a:t>5/22/2017</a:t>
             </a:fld>
             <a:endParaRPr lang="en-US"/>
           </a:p>
@@ -2907,7 +3040,7 @@
           <a:p>
             <a:fld id="{6441206B-DA31-4C64-90A6-0691DC3B803A}" type="datetime1">
               <a:rPr lang="en-US" smtClean="0"/>
-              <a:t>5/21/2017</a:t>
+              <a:t>5/22/2017</a:t>
             </a:fld>
             <a:endParaRPr lang="en-US"/>
           </a:p>
@@ -3274,7 +3407,7 @@
           <a:p>
             <a:fld id="{62371884-AD18-4130-B0B9-6BEBDE82BC10}" type="datetime1">
               <a:rPr lang="en-US" smtClean="0"/>
-              <a:t>5/21/2017</a:t>
+              <a:t>5/22/2017</a:t>
             </a:fld>
             <a:endParaRPr lang="en-US"/>
           </a:p>
@@ -3392,7 +3525,7 @@
           <a:p>
             <a:fld id="{83114A9A-820E-4873-A4E0-F47F3FE961CB}" type="datetime1">
               <a:rPr lang="en-US" smtClean="0"/>
-              <a:t>5/21/2017</a:t>
+              <a:t>5/22/2017</a:t>
             </a:fld>
             <a:endParaRPr lang="en-US"/>
           </a:p>
@@ -3487,7 +3620,7 @@
           <a:p>
             <a:fld id="{20074BF7-188E-4863-9C12-46CFAAA95B5A}" type="datetime1">
               <a:rPr lang="en-US" smtClean="0"/>
-              <a:t>5/21/2017</a:t>
+              <a:t>5/22/2017</a:t>
             </a:fld>
             <a:endParaRPr lang="en-US"/>
           </a:p>
@@ -3764,7 +3897,7 @@
           <a:p>
             <a:fld id="{477726C4-2D17-4041-B980-CFCE336423D3}" type="datetime1">
               <a:rPr lang="en-US" smtClean="0"/>
-              <a:t>5/21/2017</a:t>
+              <a:t>5/22/2017</a:t>
             </a:fld>
             <a:endParaRPr lang="en-US"/>
           </a:p>
@@ -4021,7 +4154,7 @@
           <a:p>
             <a:fld id="{0EB0BE77-6858-4CB2-B97A-87E9DD64AC4F}" type="datetime1">
               <a:rPr lang="en-US" smtClean="0"/>
-              <a:t>5/21/2017</a:t>
+              <a:t>5/22/2017</a:t>
             </a:fld>
             <a:endParaRPr lang="en-US"/>
           </a:p>
@@ -4234,7 +4367,7 @@
           <a:p>
             <a:fld id="{9FAFB7DE-EB13-49D8-B8F3-DC71A6D124C7}" type="datetime1">
               <a:rPr lang="en-US" smtClean="0"/>
-              <a:t>5/21/2017</a:t>
+              <a:t>5/22/2017</a:t>
             </a:fld>
             <a:endParaRPr lang="en-US"/>
           </a:p>
@@ -5401,9 +5534,64 @@
           </a:p>
         </p:txBody>
       </p:sp>
+      <p:sp>
+        <p:nvSpPr>
+          <p:cNvPr id="11" name="Content Placeholder 2"/>
+          <p:cNvSpPr>
+            <a:spLocks noGrp="1"/>
+          </p:cNvSpPr>
+          <p:nvPr>
+            <p:ph idx="1"/>
+          </p:nvPr>
+        </p:nvSpPr>
+        <p:spPr>
+          <a:xfrm>
+            <a:off x="249383" y="811530"/>
+            <a:ext cx="8424428" cy="2544734"/>
+          </a:xfrm>
+        </p:spPr>
+        <p:txBody>
+          <a:bodyPr>
+            <a:normAutofit/>
+          </a:bodyPr>
+          <a:lstStyle/>
+          <a:p>
+            <a:r>
+              <a:rPr lang="en-US" dirty="0" smtClean="0"/>
+              <a:t>Multi Object Tracking (MOT) benchmark</a:t>
+            </a:r>
+          </a:p>
+          <a:p>
+            <a:r>
+              <a:rPr lang="en-US" dirty="0" smtClean="0"/>
+              <a:t>11 training and 11 testing sequences</a:t>
+            </a:r>
+          </a:p>
+          <a:p>
+            <a:r>
+              <a:rPr lang="en-US" dirty="0" smtClean="0"/>
+              <a:t>Test sequence ground truth not available</a:t>
+            </a:r>
+          </a:p>
+          <a:p>
+            <a:pPr lvl="1"/>
+            <a:r>
+              <a:rPr lang="en-US" dirty="0" smtClean="0"/>
+              <a:t>6 of the training sequences used for validation</a:t>
+            </a:r>
+          </a:p>
+          <a:p>
+            <a:r>
+              <a:rPr lang="en-US" dirty="0" smtClean="0"/>
+              <a:t>Training sequence captured in similar scenario</a:t>
+            </a:r>
+            <a:endParaRPr lang="en-US" dirty="0" smtClean="0"/>
+          </a:p>
+        </p:txBody>
+      </p:sp>
       <p:pic>
         <p:nvPicPr>
-          <p:cNvPr id="2" name="Picture 1"/>
+          <p:cNvPr id="4" name="Picture 3"/>
           <p:cNvPicPr>
             <a:picLocks noChangeAspect="1"/>
           </p:cNvPicPr>
@@ -5423,8 +5611,8 @@
         </p:blipFill>
         <p:spPr>
           <a:xfrm>
-            <a:off x="127596" y="1471497"/>
-            <a:ext cx="8888808" cy="4513667"/>
+            <a:off x="1589810" y="3416536"/>
+            <a:ext cx="5964381" cy="3311186"/>
           </a:xfrm>
           <a:prstGeom prst="rect">
             <a:avLst/>
@@ -5436,98 +5624,6 @@
           </a:ln>
         </p:spPr>
       </p:pic>
-      <p:sp>
-        <p:nvSpPr>
-          <p:cNvPr id="5" name="Rectangle 4"/>
-          <p:cNvSpPr/>
-          <p:nvPr/>
-        </p:nvSpPr>
-        <p:spPr>
-          <a:xfrm>
-            <a:off x="218209" y="1579418"/>
-            <a:ext cx="841664" cy="394855"/>
-          </a:xfrm>
-          <a:prstGeom prst="rect">
-            <a:avLst/>
-          </a:prstGeom>
-          <a:noFill/>
-          <a:ln w="28575">
-            <a:solidFill>
-              <a:srgbClr val="00B050"/>
-            </a:solidFill>
-          </a:ln>
-        </p:spPr>
-        <p:style>
-          <a:lnRef idx="2">
-            <a:schemeClr val="accent1">
-              <a:shade val="50000"/>
-            </a:schemeClr>
-          </a:lnRef>
-          <a:fillRef idx="1">
-            <a:schemeClr val="accent1"/>
-          </a:fillRef>
-          <a:effectRef idx="0">
-            <a:schemeClr val="accent1"/>
-          </a:effectRef>
-          <a:fontRef idx="minor">
-            <a:schemeClr val="lt1"/>
-          </a:fontRef>
-        </p:style>
-        <p:txBody>
-          <a:bodyPr rtlCol="0" anchor="ctr"/>
-          <a:lstStyle/>
-          <a:p>
-            <a:pPr algn="ctr"/>
-            <a:endParaRPr lang="en-US"/>
-          </a:p>
-        </p:txBody>
-      </p:sp>
-      <p:sp>
-        <p:nvSpPr>
-          <p:cNvPr id="10" name="Rectangle 9"/>
-          <p:cNvSpPr/>
-          <p:nvPr/>
-        </p:nvSpPr>
-        <p:spPr>
-          <a:xfrm>
-            <a:off x="204354" y="2230582"/>
-            <a:ext cx="841664" cy="394855"/>
-          </a:xfrm>
-          <a:prstGeom prst="rect">
-            <a:avLst/>
-          </a:prstGeom>
-          <a:noFill/>
-          <a:ln w="28575">
-            <a:solidFill>
-              <a:srgbClr val="00B050"/>
-            </a:solidFill>
-          </a:ln>
-        </p:spPr>
-        <p:style>
-          <a:lnRef idx="2">
-            <a:schemeClr val="accent1">
-              <a:shade val="50000"/>
-            </a:schemeClr>
-          </a:lnRef>
-          <a:fillRef idx="1">
-            <a:schemeClr val="accent1"/>
-          </a:fillRef>
-          <a:effectRef idx="0">
-            <a:schemeClr val="accent1"/>
-          </a:effectRef>
-          <a:fontRef idx="minor">
-            <a:schemeClr val="lt1"/>
-          </a:fontRef>
-        </p:style>
-        <p:txBody>
-          <a:bodyPr rtlCol="0" anchor="ctr"/>
-          <a:lstStyle/>
-          <a:p>
-            <a:pPr algn="ctr"/>
-            <a:endParaRPr lang="en-US"/>
-          </a:p>
-        </p:txBody>
-      </p:sp>
     </p:spTree>
     <p:extLst>
       <p:ext uri="{BB962C8B-B14F-4D97-AF65-F5344CB8AC3E}">
@@ -5929,11 +6025,7 @@
                     <a:p>
                       <a:r>
                         <a:rPr lang="en-US" sz="1500" dirty="0" smtClean="0"/>
-                        <a:t>Total </a:t>
-                      </a:r>
-                      <a:r>
-                        <a:rPr lang="en-US" sz="1500" dirty="0" smtClean="0"/>
-                        <a:t>number of </a:t>
+                        <a:t>Total number of </a:t>
                       </a:r>
                       <a:r>
                         <a:rPr lang="en-US" sz="1500" b="1" dirty="0" smtClean="0"/>
@@ -5986,11 +6078,7 @@
                     <a:p>
                       <a:r>
                         <a:rPr lang="en-US" sz="1500" dirty="0" smtClean="0"/>
-                        <a:t>Total </a:t>
-                      </a:r>
-                      <a:r>
-                        <a:rPr lang="en-US" sz="1500" dirty="0" smtClean="0"/>
-                        <a:t>number of </a:t>
+                        <a:t>Total number of </a:t>
                       </a:r>
                       <a:r>
                         <a:rPr lang="en-US" sz="1500" b="1" dirty="0" smtClean="0"/>
@@ -6039,11 +6127,7 @@
                     <a:p>
                       <a:r>
                         <a:rPr lang="en-US" sz="1500" dirty="0" smtClean="0"/>
-                        <a:t>Total </a:t>
-                      </a:r>
-                      <a:r>
-                        <a:rPr lang="en-US" sz="1500" dirty="0" smtClean="0"/>
-                        <a:t>number of times a trajectory is </a:t>
+                        <a:t>Total number of times a trajectory is </a:t>
                       </a:r>
                       <a:r>
                         <a:rPr lang="en-US" sz="1500" b="1" dirty="0" smtClean="0"/>
@@ -6424,14 +6508,164 @@
   <p:clrMapOvr>
     <a:masterClrMapping/>
   </p:clrMapOvr>
-  <mc:AlternateContent xmlns:mc="http://schemas.openxmlformats.org/markup-compatibility/2006">
-    <mc:Choice xmlns:p14="http://schemas.microsoft.com/office/powerpoint/2010/main" Requires="p14">
+  <mc:AlternateContent xmlns:mc="http://schemas.openxmlformats.org/markup-compatibility/2006" xmlns:p14="http://schemas.microsoft.com/office/powerpoint/2010/main">
+    <mc:Choice Requires="p14">
       <p:transition spd="slow" p14:dur="2000"/>
     </mc:Choice>
-    <mc:Fallback>
+    <mc:Fallback xmlns="">
       <p:transition spd="slow"/>
     </mc:Fallback>
   </mc:AlternateContent>
+  <p:timing>
+    <p:tnLst>
+      <p:par>
+        <p:cTn id="1" dur="indefinite" restart="never" nodeType="tmRoot"/>
+      </p:par>
+    </p:tnLst>
+  </p:timing>
+</p:sld>
+</file>
+
+<file path=ppt/slides/slide16.xml><?xml version="1.0" encoding="utf-8"?>
+<p:sld xmlns:a="http://schemas.openxmlformats.org/drawingml/2006/main" xmlns:r="http://schemas.openxmlformats.org/officeDocument/2006/relationships" xmlns:p="http://schemas.openxmlformats.org/presentationml/2006/main">
+  <p:cSld>
+    <p:spTree>
+      <p:nvGrpSpPr>
+        <p:cNvPr id="1" name=""/>
+        <p:cNvGrpSpPr/>
+        <p:nvPr/>
+      </p:nvGrpSpPr>
+      <p:grpSpPr>
+        <a:xfrm>
+          <a:off x="0" y="0"/>
+          <a:ext cx="0" cy="0"/>
+          <a:chOff x="0" y="0"/>
+          <a:chExt cx="0" cy="0"/>
+        </a:xfrm>
+      </p:grpSpPr>
+      <p:sp>
+        <p:nvSpPr>
+          <p:cNvPr id="7" name="Slide Number Placeholder 6"/>
+          <p:cNvSpPr>
+            <a:spLocks noGrp="1"/>
+          </p:cNvSpPr>
+          <p:nvPr>
+            <p:ph type="sldNum" sz="quarter" idx="12"/>
+          </p:nvPr>
+        </p:nvSpPr>
+        <p:spPr/>
+        <p:txBody>
+          <a:bodyPr/>
+          <a:lstStyle/>
+          <a:p>
+            <a:fld id="{F8BDD257-2590-461B-B03B-C03B735556C8}" type="slidenum">
+              <a:rPr lang="en-US" smtClean="0"/>
+              <a:t>16</a:t>
+            </a:fld>
+            <a:endParaRPr lang="en-US"/>
+          </a:p>
+        </p:txBody>
+      </p:sp>
+      <p:sp>
+        <p:nvSpPr>
+          <p:cNvPr id="8" name="Title 1"/>
+          <p:cNvSpPr>
+            <a:spLocks noGrp="1"/>
+          </p:cNvSpPr>
+          <p:nvPr>
+            <p:ph type="title"/>
+          </p:nvPr>
+        </p:nvSpPr>
+        <p:spPr>
+          <a:xfrm>
+            <a:off x="470189" y="45383"/>
+            <a:ext cx="8203622" cy="705875"/>
+          </a:xfrm>
+        </p:spPr>
+        <p:txBody>
+          <a:bodyPr>
+            <a:normAutofit/>
+          </a:bodyPr>
+          <a:lstStyle/>
+          <a:p>
+            <a:pPr algn="ctr"/>
+            <a:r>
+              <a:rPr lang="en-US" dirty="0" smtClean="0"/>
+              <a:t>Analysis on Validation Set</a:t>
+            </a:r>
+            <a:endParaRPr lang="en-US" dirty="0"/>
+          </a:p>
+        </p:txBody>
+      </p:sp>
+      <p:sp>
+        <p:nvSpPr>
+          <p:cNvPr id="11" name="Content Placeholder 2"/>
+          <p:cNvSpPr>
+            <a:spLocks noGrp="1"/>
+          </p:cNvSpPr>
+          <p:nvPr>
+            <p:ph idx="1"/>
+          </p:nvPr>
+        </p:nvSpPr>
+        <p:spPr>
+          <a:xfrm>
+            <a:off x="249383" y="811530"/>
+            <a:ext cx="8424428" cy="487334"/>
+          </a:xfrm>
+        </p:spPr>
+        <p:txBody>
+          <a:bodyPr>
+            <a:normAutofit/>
+          </a:bodyPr>
+          <a:lstStyle/>
+          <a:p>
+            <a:r>
+              <a:rPr lang="en-US" dirty="0" smtClean="0"/>
+              <a:t>Number of templates in the history</a:t>
+            </a:r>
+          </a:p>
+        </p:txBody>
+      </p:sp>
+      <p:pic>
+        <p:nvPicPr>
+          <p:cNvPr id="2" name="Picture 1"/>
+          <p:cNvPicPr>
+            <a:picLocks noChangeAspect="1"/>
+          </p:cNvPicPr>
+          <p:nvPr/>
+        </p:nvPicPr>
+        <p:blipFill>
+          <a:blip r:embed="rId3">
+            <a:extLst>
+              <a:ext uri="{28A0092B-C50C-407E-A947-70E740481C1C}">
+                <a14:useLocalDpi xmlns:a14="http://schemas.microsoft.com/office/drawing/2010/main" val="0"/>
+              </a:ext>
+            </a:extLst>
+          </a:blip>
+          <a:stretch>
+            <a:fillRect/>
+          </a:stretch>
+        </p:blipFill>
+        <p:spPr>
+          <a:xfrm>
+            <a:off x="249383" y="1464826"/>
+            <a:ext cx="8690325" cy="3948838"/>
+          </a:xfrm>
+          <a:prstGeom prst="rect">
+            <a:avLst/>
+          </a:prstGeom>
+        </p:spPr>
+      </p:pic>
+    </p:spTree>
+    <p:extLst>
+      <p:ext uri="{BB962C8B-B14F-4D97-AF65-F5344CB8AC3E}">
+        <p14:creationId xmlns:p14="http://schemas.microsoft.com/office/powerpoint/2010/main" val="1247245842"/>
+      </p:ext>
+    </p:extLst>
+  </p:cSld>
+  <p:clrMapOvr>
+    <a:masterClrMapping/>
+  </p:clrMapOvr>
   <p:timing>
     <p:tnLst>
       <p:par>
@@ -7567,15 +7801,7 @@
             <a:pPr lvl="1"/>
             <a:r>
               <a:rPr lang="en-US" dirty="0" smtClean="0"/>
-              <a:t>Euclidean distance between </a:t>
-            </a:r>
-            <a:r>
-              <a:rPr lang="en-US" dirty="0" smtClean="0"/>
-              <a:t>initial point </a:t>
-            </a:r>
-            <a:r>
-              <a:rPr lang="en-US" dirty="0" smtClean="0"/>
-              <a:t>and FB prediction</a:t>
+              <a:t>Euclidean distance between initial point and FB prediction</a:t>
             </a:r>
           </a:p>
           <a:p>

</xml_diff>

<commit_message>
minor fixes in ppt
</commit_message>
<xml_diff>
--- a/Tracking/17_5_22 Learning to Track Online Multi-object Tracking by Decision Making  iccv15/mdp_tracking.pptx
+++ b/Tracking/17_5_22 Learning to Track Online Multi-object Tracking by Decision Making  iccv15/mdp_tracking.pptx
@@ -1711,25 +1711,7 @@
           <a:p>
             <a:r>
               <a:rPr lang="en-US" dirty="0" smtClean="0"/>
-              <a:t>For all test sequences</a:t>
-            </a:r>
-            <a:r>
-              <a:rPr lang="en-US" baseline="0" dirty="0" smtClean="0"/>
-              <a:t> except AVG town </a:t>
-            </a:r>
-            <a:r>
-              <a:rPr lang="en-US" baseline="0" dirty="0" err="1" smtClean="0"/>
-              <a:t>centre</a:t>
-            </a:r>
-            <a:r>
-              <a:rPr lang="en-US" baseline="0" dirty="0" smtClean="0"/>
-              <a:t>, there are training sequences captured in similar scenario as indicated by the naming of the sequences;</a:t>
-            </a:r>
-          </a:p>
-          <a:p>
-            <a:r>
-              <a:rPr lang="en-US" baseline="0" dirty="0" smtClean="0"/>
-              <a:t>This can allow us to learn meaningful characteristics from training sequences and use them for testing;</a:t>
+              <a:t>These are the results on the remaining metrics;</a:t>
             </a:r>
           </a:p>
           <a:p>
@@ -1819,26 +1801,11 @@
           <a:p>
             <a:r>
               <a:rPr lang="en-US" dirty="0" smtClean="0"/>
-              <a:t>For all test sequences</a:t>
-            </a:r>
-            <a:r>
-              <a:rPr lang="en-US" baseline="0" dirty="0" smtClean="0"/>
-              <a:t> except AVG town </a:t>
-            </a:r>
-            <a:r>
-              <a:rPr lang="en-US" baseline="0" dirty="0" err="1" smtClean="0"/>
-              <a:t>centre</a:t>
-            </a:r>
-            <a:r>
-              <a:rPr lang="en-US" baseline="0" dirty="0" smtClean="0"/>
-              <a:t>, there are training sequences captured in similar scenario as indicated by the naming of the sequences;</a:t>
-            </a:r>
-          </a:p>
-          <a:p>
-            <a:r>
-              <a:rPr lang="en-US" baseline="0" dirty="0" smtClean="0"/>
-              <a:t>This can allow us to learn meaningful characteristics from training sequences and use them for testing;</a:t>
-            </a:r>
+              <a:t>These are some screenshots from the MOT dataset with tracked objects shown;</a:t>
+            </a:r>
+          </a:p>
+          <a:p>
+            <a:endParaRPr lang="en-US" baseline="0" dirty="0" smtClean="0"/>
           </a:p>
           <a:p>
             <a:endParaRPr lang="en-US" dirty="0"/>
@@ -1924,30 +1891,6 @@
         <p:txBody>
           <a:bodyPr/>
           <a:lstStyle/>
-          <a:p>
-            <a:r>
-              <a:rPr lang="en-US" dirty="0" smtClean="0"/>
-              <a:t>For all test sequences</a:t>
-            </a:r>
-            <a:r>
-              <a:rPr lang="en-US" baseline="0" dirty="0" smtClean="0"/>
-              <a:t> except AVG town </a:t>
-            </a:r>
-            <a:r>
-              <a:rPr lang="en-US" baseline="0" dirty="0" err="1" smtClean="0"/>
-              <a:t>centre</a:t>
-            </a:r>
-            <a:r>
-              <a:rPr lang="en-US" baseline="0" dirty="0" smtClean="0"/>
-              <a:t>, there are training sequences captured in similar scenario as indicated by the naming of the sequences;</a:t>
-            </a:r>
-          </a:p>
-          <a:p>
-            <a:r>
-              <a:rPr lang="en-US" baseline="0" dirty="0" smtClean="0"/>
-              <a:t>This can allow us to learn meaningful characteristics from training sequences and use them for testing;</a:t>
-            </a:r>
-          </a:p>
           <a:p>
             <a:endParaRPr lang="en-US" dirty="0"/>
           </a:p>
@@ -7405,7 +7348,7 @@
           <p:nvPr>
             <p:extLst>
               <p:ext uri="{D42A27DB-BD31-4B8C-83A1-F6EECF244321}">
-                <p14:modId xmlns:p14="http://schemas.microsoft.com/office/powerpoint/2010/main" val="3105060236"/>
+                <p14:modId xmlns:p14="http://schemas.microsoft.com/office/powerpoint/2010/main" val="1962823542"/>
               </p:ext>
             </p:extLst>
           </p:nvPr>
@@ -9931,13 +9874,16 @@
                       <a:pPr algn="r" fontAlgn="b"/>
                       <a:r>
                         <a:rPr lang="en-US" sz="1900" b="1" u="none" strike="noStrike" dirty="0">
+                          <a:solidFill>
+                            <a:srgbClr val="7030A0"/>
+                          </a:solidFill>
                           <a:effectLst/>
                         </a:rPr>
                         <a:t>73.9</a:t>
                       </a:r>
                       <a:endParaRPr lang="en-US" sz="1900" b="1" i="0" u="none" strike="noStrike" dirty="0">
                         <a:solidFill>
-                          <a:srgbClr val="000000"/>
+                          <a:srgbClr val="7030A0"/>
                         </a:solidFill>
                         <a:effectLst/>
                         <a:latin typeface="Calibri" panose="020F0502020204030204" pitchFamily="34" charset="0"/>
@@ -10261,13 +10207,16 @@
                       <a:pPr algn="r" fontAlgn="b"/>
                       <a:r>
                         <a:rPr lang="en-US" sz="1900" b="1" u="none" strike="noStrike" dirty="0">
+                          <a:solidFill>
+                            <a:srgbClr val="7030A0"/>
+                          </a:solidFill>
                           <a:effectLst/>
                         </a:rPr>
                         <a:t>91</a:t>
                       </a:r>
                       <a:endParaRPr lang="en-US" sz="1900" b="1" i="0" u="none" strike="noStrike" dirty="0">
                         <a:solidFill>
-                          <a:srgbClr val="000000"/>
+                          <a:srgbClr val="7030A0"/>
                         </a:solidFill>
                         <a:effectLst/>
                         <a:latin typeface="Calibri" panose="020F0502020204030204" pitchFamily="34" charset="0"/>
@@ -10456,13 +10405,16 @@
                       <a:pPr algn="r" fontAlgn="b"/>
                       <a:r>
                         <a:rPr lang="en-US" sz="1900" b="1" u="none" strike="noStrike" dirty="0">
+                          <a:solidFill>
+                            <a:srgbClr val="7030A0"/>
+                          </a:solidFill>
                           <a:effectLst/>
                         </a:rPr>
                         <a:t>26.7</a:t>
                       </a:r>
                       <a:endParaRPr lang="en-US" sz="1900" b="1" i="0" u="none" strike="noStrike" dirty="0">
                         <a:solidFill>
-                          <a:srgbClr val="000000"/>
+                          <a:srgbClr val="7030A0"/>
                         </a:solidFill>
                         <a:effectLst/>
                         <a:latin typeface="Calibri" panose="020F0502020204030204" pitchFamily="34" charset="0"/>
@@ -10588,13 +10540,16 @@
                       <a:pPr algn="r" fontAlgn="b"/>
                       <a:r>
                         <a:rPr lang="en-US" sz="1900" b="1" u="none" strike="noStrike" dirty="0">
+                          <a:solidFill>
+                            <a:srgbClr val="7030A0"/>
+                          </a:solidFill>
                           <a:effectLst/>
                         </a:rPr>
                         <a:t>12</a:t>
                       </a:r>
                       <a:endParaRPr lang="en-US" sz="1900" b="1" i="0" u="none" strike="noStrike" dirty="0">
                         <a:solidFill>
-                          <a:srgbClr val="000000"/>
+                          <a:srgbClr val="7030A0"/>
                         </a:solidFill>
                         <a:effectLst/>
                         <a:latin typeface="Calibri" panose="020F0502020204030204" pitchFamily="34" charset="0"/>
@@ -10786,13 +10741,16 @@
                       <a:pPr algn="r" fontAlgn="b"/>
                       <a:r>
                         <a:rPr lang="en-US" sz="1900" b="1" u="none" strike="noStrike" dirty="0">
+                          <a:solidFill>
+                            <a:srgbClr val="7030A0"/>
+                          </a:solidFill>
                           <a:effectLst/>
                         </a:rPr>
                         <a:t>13,415</a:t>
                       </a:r>
                       <a:endParaRPr lang="en-US" sz="1900" b="1" i="0" u="none" strike="noStrike" dirty="0">
                         <a:solidFill>
-                          <a:srgbClr val="000000"/>
+                          <a:srgbClr val="7030A0"/>
                         </a:solidFill>
                         <a:effectLst/>
                         <a:latin typeface="Calibri" panose="020F0502020204030204" pitchFamily="34" charset="0"/>
@@ -12820,13 +12778,16 @@
                       <a:pPr algn="r" fontAlgn="b"/>
                       <a:r>
                         <a:rPr lang="en-US" sz="1900" b="1" u="none" strike="noStrike" dirty="0">
+                          <a:solidFill>
+                            <a:srgbClr val="7030A0"/>
+                          </a:solidFill>
                           <a:effectLst/>
                         </a:rPr>
                         <a:t>26.7</a:t>
                       </a:r>
                       <a:endParaRPr lang="en-US" sz="1900" b="1" i="0" u="none" strike="noStrike" dirty="0">
                         <a:solidFill>
-                          <a:srgbClr val="000000"/>
+                          <a:srgbClr val="7030A0"/>
                         </a:solidFill>
                         <a:effectLst/>
                         <a:latin typeface="Calibri" panose="020F0502020204030204" pitchFamily="34" charset="0"/>
@@ -12952,13 +12913,16 @@
                       <a:pPr algn="r" fontAlgn="b"/>
                       <a:r>
                         <a:rPr lang="en-US" sz="1900" b="1" u="none" strike="noStrike" dirty="0">
+                          <a:solidFill>
+                            <a:srgbClr val="7030A0"/>
+                          </a:solidFill>
                           <a:effectLst/>
                         </a:rPr>
                         <a:t>12</a:t>
                       </a:r>
                       <a:endParaRPr lang="en-US" sz="1900" b="1" i="0" u="none" strike="noStrike" dirty="0">
                         <a:solidFill>
-                          <a:srgbClr val="000000"/>
+                          <a:srgbClr val="7030A0"/>
                         </a:solidFill>
                         <a:effectLst/>
                         <a:latin typeface="Calibri" panose="020F0502020204030204" pitchFamily="34" charset="0"/>
@@ -13018,13 +12982,16 @@
                       <a:pPr algn="r" fontAlgn="b"/>
                       <a:r>
                         <a:rPr lang="en-US" sz="1900" b="1" u="none" strike="noStrike" dirty="0">
+                          <a:solidFill>
+                            <a:srgbClr val="7030A0"/>
+                          </a:solidFill>
                           <a:effectLst/>
                         </a:rPr>
                         <a:t>51.7</a:t>
                       </a:r>
                       <a:endParaRPr lang="en-US" sz="1900" b="1" i="0" u="none" strike="noStrike" dirty="0">
                         <a:solidFill>
-                          <a:srgbClr val="000000"/>
+                          <a:srgbClr val="7030A0"/>
                         </a:solidFill>
                         <a:effectLst/>
                         <a:latin typeface="Calibri" panose="020F0502020204030204" pitchFamily="34" charset="0"/>
@@ -13675,13 +13642,16 @@
                       <a:pPr algn="r" fontAlgn="b"/>
                       <a:r>
                         <a:rPr lang="en-US" sz="1900" b="1" u="none" strike="noStrike" dirty="0">
+                          <a:solidFill>
+                            <a:srgbClr val="7030A0"/>
+                          </a:solidFill>
                           <a:effectLst/>
                         </a:rPr>
                         <a:t>2,691</a:t>
                       </a:r>
                       <a:endParaRPr lang="en-US" sz="1900" b="1" i="0" u="none" strike="noStrike" dirty="0">
                         <a:solidFill>
-                          <a:srgbClr val="000000"/>
+                          <a:srgbClr val="7030A0"/>
                         </a:solidFill>
                         <a:effectLst/>
                         <a:latin typeface="Calibri" panose="020F0502020204030204" pitchFamily="34" charset="0"/>
@@ -13873,13 +13843,16 @@
                       <a:pPr algn="r" fontAlgn="b"/>
                       <a:r>
                         <a:rPr lang="en-US" sz="1900" b="1" u="none" strike="noStrike" dirty="0">
+                          <a:solidFill>
+                            <a:srgbClr val="7030A0"/>
+                          </a:solidFill>
                           <a:effectLst/>
                         </a:rPr>
                         <a:t>276</a:t>
                       </a:r>
                       <a:endParaRPr lang="en-US" sz="1900" b="1" i="0" u="none" strike="noStrike" dirty="0">
                         <a:solidFill>
-                          <a:srgbClr val="000000"/>
+                          <a:srgbClr val="7030A0"/>
                         </a:solidFill>
                         <a:effectLst/>
                         <a:latin typeface="Calibri" panose="020F0502020204030204" pitchFamily="34" charset="0"/>
@@ -14134,13 +14107,16 @@
                       <a:pPr algn="r" fontAlgn="b"/>
                       <a:r>
                         <a:rPr lang="en-US" sz="1900" b="1" u="none" strike="noStrike" dirty="0">
+                          <a:solidFill>
+                            <a:srgbClr val="7030A0"/>
+                          </a:solidFill>
                           <a:effectLst/>
                         </a:rPr>
                         <a:t>12</a:t>
                       </a:r>
                       <a:endParaRPr lang="en-US" sz="1900" b="1" i="0" u="none" strike="noStrike" dirty="0">
                         <a:solidFill>
-                          <a:srgbClr val="000000"/>
+                          <a:srgbClr val="7030A0"/>
                         </a:solidFill>
                         <a:effectLst/>
                         <a:latin typeface="Calibri" panose="020F0502020204030204" pitchFamily="34" charset="0"/>
@@ -16405,7 +16381,7 @@
           <p:nvPr>
             <p:extLst>
               <p:ext uri="{D42A27DB-BD31-4B8C-83A1-F6EECF244321}">
-                <p14:modId xmlns:p14="http://schemas.microsoft.com/office/powerpoint/2010/main" val="1674428442"/>
+                <p14:modId xmlns:p14="http://schemas.microsoft.com/office/powerpoint/2010/main" val="3866574771"/>
               </p:ext>
             </p:extLst>
           </p:nvPr>
@@ -19878,13 +19854,16 @@
                       <a:pPr algn="ctr" fontAlgn="b"/>
                       <a:r>
                         <a:rPr lang="en-US" sz="1700" b="1" u="none" strike="noStrike" dirty="0">
+                          <a:solidFill>
+                            <a:srgbClr val="7030A0"/>
+                          </a:solidFill>
                           <a:effectLst/>
                         </a:rPr>
                         <a:t>71.7</a:t>
                       </a:r>
                       <a:endParaRPr lang="en-US" sz="1700" b="1" i="0" u="none" strike="noStrike" dirty="0">
                         <a:solidFill>
-                          <a:srgbClr val="000000"/>
+                          <a:srgbClr val="7030A0"/>
                         </a:solidFill>
                         <a:effectLst/>
                         <a:latin typeface="Calibri" panose="020F0502020204030204" pitchFamily="34" charset="0"/>
@@ -21207,13 +21186,16 @@
                       <a:pPr algn="ctr" fontAlgn="b"/>
                       <a:r>
                         <a:rPr lang="en-US" sz="1700" b="1" u="none" strike="noStrike" dirty="0">
+                          <a:solidFill>
+                            <a:srgbClr val="7030A0"/>
+                          </a:solidFill>
                           <a:effectLst/>
                         </a:rPr>
                         <a:t>30.3</a:t>
                       </a:r>
                       <a:endParaRPr lang="en-US" sz="1700" b="1" i="0" u="none" strike="noStrike" dirty="0">
                         <a:solidFill>
-                          <a:srgbClr val="000000"/>
+                          <a:srgbClr val="7030A0"/>
                         </a:solidFill>
                         <a:effectLst/>
                         <a:latin typeface="Calibri" panose="020F0502020204030204" pitchFamily="34" charset="0"/>
@@ -21339,9 +21321,18 @@
                       <a:pPr algn="ctr" fontAlgn="b"/>
                       <a:r>
                         <a:rPr lang="en-US" sz="1700" b="1" u="none" strike="noStrike" dirty="0">
+                          <a:solidFill>
+                            <a:srgbClr val="7030A0"/>
+                          </a:solidFill>
                           <a:effectLst/>
                         </a:rPr>
-                        <a:t>13.00%</a:t>
+                        <a:t>13.00</a:t>
+                      </a:r>
+                      <a:r>
+                        <a:rPr lang="en-US" sz="1700" b="1" u="none" strike="noStrike" dirty="0">
+                          <a:effectLst/>
+                        </a:rPr>
+                        <a:t>%</a:t>
                       </a:r>
                       <a:endParaRPr lang="en-US" sz="1700" b="1" i="0" u="none" strike="noStrike" dirty="0">
                         <a:solidFill>
@@ -21405,9 +21396,18 @@
                       <a:pPr algn="ctr" fontAlgn="b"/>
                       <a:r>
                         <a:rPr lang="en-US" sz="1700" b="1" u="none" strike="noStrike" dirty="0">
+                          <a:solidFill>
+                            <a:srgbClr val="7030A0"/>
+                          </a:solidFill>
                           <a:effectLst/>
                         </a:rPr>
-                        <a:t>38.40%</a:t>
+                        <a:t>38.40</a:t>
+                      </a:r>
+                      <a:r>
+                        <a:rPr lang="en-US" sz="1700" b="1" u="none" strike="noStrike" dirty="0">
+                          <a:effectLst/>
+                        </a:rPr>
+                        <a:t>%</a:t>
                       </a:r>
                       <a:endParaRPr lang="en-US" sz="1700" b="1" i="0" u="none" strike="noStrike" dirty="0">
                         <a:solidFill>
@@ -21630,7 +21630,7 @@
           <p:nvPr>
             <p:extLst>
               <p:ext uri="{D42A27DB-BD31-4B8C-83A1-F6EECF244321}">
-                <p14:modId xmlns:p14="http://schemas.microsoft.com/office/powerpoint/2010/main" val="1346841308"/>
+                <p14:modId xmlns:p14="http://schemas.microsoft.com/office/powerpoint/2010/main" val="748206471"/>
               </p:ext>
             </p:extLst>
           </p:nvPr>
@@ -22503,13 +22503,16 @@
                       <a:pPr algn="ctr" fontAlgn="b"/>
                       <a:r>
                         <a:rPr lang="en-US" sz="1800" b="1" u="none" strike="noStrike" dirty="0">
+                          <a:solidFill>
+                            <a:srgbClr val="7030A0"/>
+                          </a:solidFill>
                           <a:effectLst/>
                         </a:rPr>
                         <a:t>444.8</a:t>
                       </a:r>
                       <a:endParaRPr lang="en-US" sz="1800" b="1" i="0" u="none" strike="noStrike" dirty="0">
                         <a:solidFill>
-                          <a:srgbClr val="000000"/>
+                          <a:srgbClr val="7030A0"/>
                         </a:solidFill>
                         <a:effectLst/>
                         <a:latin typeface="Calibri" panose="020F0502020204030204" pitchFamily="34" charset="0"/>
@@ -22825,13 +22828,16 @@
                       <a:pPr algn="ctr" fontAlgn="b"/>
                       <a:r>
                         <a:rPr lang="en-US" sz="1800" b="1" u="none" strike="noStrike" dirty="0">
+                          <a:solidFill>
+                            <a:srgbClr val="7030A0"/>
+                          </a:solidFill>
                           <a:effectLst/>
                         </a:rPr>
                         <a:t>637</a:t>
                       </a:r>
                       <a:endParaRPr lang="en-US" sz="1800" b="1" i="0" u="none" strike="noStrike" dirty="0">
                         <a:solidFill>
-                          <a:srgbClr val="000000"/>
+                          <a:srgbClr val="7030A0"/>
                         </a:solidFill>
                         <a:effectLst/>
                         <a:latin typeface="Calibri" panose="020F0502020204030204" pitchFamily="34" charset="0"/>
@@ -24963,13 +24969,16 @@
                       <a:pPr algn="ctr" fontAlgn="b"/>
                       <a:r>
                         <a:rPr lang="en-US" sz="1800" b="1" u="none" strike="noStrike" dirty="0">
+                          <a:solidFill>
+                            <a:srgbClr val="7030A0"/>
+                          </a:solidFill>
                           <a:effectLst/>
                         </a:rPr>
                         <a:t>7,890</a:t>
                       </a:r>
                       <a:endParaRPr lang="en-US" sz="1800" b="1" i="0" u="none" strike="noStrike" dirty="0">
                         <a:solidFill>
-                          <a:srgbClr val="000000"/>
+                          <a:srgbClr val="7030A0"/>
                         </a:solidFill>
                         <a:effectLst/>
                         <a:latin typeface="Calibri" panose="020F0502020204030204" pitchFamily="34" charset="0"/>
@@ -25161,13 +25170,16 @@
                       <a:pPr algn="ctr" fontAlgn="b"/>
                       <a:r>
                         <a:rPr lang="en-US" sz="1800" b="1" u="none" strike="noStrike" dirty="0">
+                          <a:solidFill>
+                            <a:srgbClr val="7030A0"/>
+                          </a:solidFill>
                           <a:effectLst/>
                         </a:rPr>
                         <a:t>737</a:t>
                       </a:r>
                       <a:endParaRPr lang="en-US" sz="1800" b="1" i="0" u="none" strike="noStrike" dirty="0">
                         <a:solidFill>
-                          <a:srgbClr val="000000"/>
+                          <a:srgbClr val="7030A0"/>
                         </a:solidFill>
                         <a:effectLst/>
                         <a:latin typeface="Calibri" panose="020F0502020204030204" pitchFamily="34" charset="0"/>
@@ -26407,13 +26419,16 @@
                       <a:pPr algn="ctr" fontAlgn="b"/>
                       <a:r>
                         <a:rPr lang="en-US" sz="1800" b="1" u="none" strike="noStrike" dirty="0">
+                          <a:solidFill>
+                            <a:srgbClr val="7030A0"/>
+                          </a:solidFill>
                           <a:effectLst/>
                         </a:rPr>
                         <a:t>32,422</a:t>
                       </a:r>
                       <a:endParaRPr lang="en-US" sz="1800" b="1" i="0" u="none" strike="noStrike" dirty="0">
                         <a:solidFill>
-                          <a:srgbClr val="000000"/>
+                          <a:srgbClr val="7030A0"/>
                         </a:solidFill>
                         <a:effectLst/>
                         <a:latin typeface="Calibri" panose="020F0502020204030204" pitchFamily="34" charset="0"/>

</xml_diff>

<commit_message>
added dataset section to readme
</commit_message>
<xml_diff>
--- a/Tracking/17_5_22 Learning to Track Online Multi-object Tracking by Decision Making  iccv15/mdp_tracking.pptx
+++ b/Tracking/17_5_22 Learning to Track Online Multi-object Tracking by Decision Making  iccv15/mdp_tracking.pptx
@@ -974,6 +974,16 @@
           <a:bodyPr/>
           <a:lstStyle/>
           <a:p>
+            <a:r>
+              <a:rPr lang="en-US" dirty="0" smtClean="0"/>
+              <a:t>Green ones are those where higher is better while orange ones have lower </a:t>
+            </a:r>
+            <a:r>
+              <a:rPr lang="en-US" smtClean="0"/>
+              <a:t>is better;</a:t>
+            </a:r>
+          </a:p>
+          <a:p>
             <a:endParaRPr lang="en-US" dirty="0"/>
           </a:p>
         </p:txBody>
@@ -1804,6 +1814,26 @@
             <a:r>
               <a:rPr lang="en-US" dirty="0" smtClean="0"/>
               <a:t>These are some screenshots from the MOT dataset with tracked objects shown;</a:t>
+            </a:r>
+          </a:p>
+          <a:p>
+            <a:r>
+              <a:rPr lang="en-US" baseline="0" dirty="0" smtClean="0"/>
+              <a:t>I did run the code on all test sequences from MOT 2015 but it only produces a text file as output that can be read by the MOT evaluation </a:t>
+            </a:r>
+            <a:r>
+              <a:rPr lang="en-US" baseline="0" dirty="0" err="1" smtClean="0"/>
+              <a:t>fkit</a:t>
+            </a:r>
+            <a:r>
+              <a:rPr lang="en-US" baseline="0" dirty="0" smtClean="0"/>
+              <a:t>;</a:t>
+            </a:r>
+          </a:p>
+          <a:p>
+            <a:r>
+              <a:rPr lang="en-US" baseline="0" dirty="0" smtClean="0"/>
+              <a:t>This kit, however, provides no tools for visualization;</a:t>
             </a:r>
           </a:p>
           <a:p>

</xml_diff>